<commit_message>
update instructions nl balloonpop
</commit_message>
<xml_diff>
--- a/scratch-leapmotion/instructions/nl/Scratch-opdracht_04_BalloonPop.pptx
+++ b/scratch-leapmotion/instructions/nl/Scratch-opdracht_04_BalloonPop.pptx
@@ -5,10 +5,10 @@
     <p:sldMasterId id="2147483648" r:id="rId1"/>
   </p:sldMasterIdLst>
   <p:notesMasterIdLst>
-    <p:notesMasterId r:id="rId10"/>
+    <p:notesMasterId r:id="rId11"/>
   </p:notesMasterIdLst>
   <p:handoutMasterIdLst>
-    <p:handoutMasterId r:id="rId11"/>
+    <p:handoutMasterId r:id="rId12"/>
   </p:handoutMasterIdLst>
   <p:sldIdLst>
     <p:sldId id="256" r:id="rId2"/>
@@ -16,9 +16,10 @@
     <p:sldId id="259" r:id="rId4"/>
     <p:sldId id="278" r:id="rId5"/>
     <p:sldId id="279" r:id="rId6"/>
-    <p:sldId id="281" r:id="rId7"/>
-    <p:sldId id="282" r:id="rId8"/>
-    <p:sldId id="283" r:id="rId9"/>
+    <p:sldId id="285" r:id="rId7"/>
+    <p:sldId id="281" r:id="rId8"/>
+    <p:sldId id="282" r:id="rId9"/>
+    <p:sldId id="283" r:id="rId10"/>
   </p:sldIdLst>
   <p:sldSz cx="9144000" cy="6858000" type="screen4x3"/>
   <p:notesSz cx="6858000" cy="9144000"/>
@@ -117,6 +118,22 @@
       </a:defRPr>
     </a:lvl9pPr>
   </p:defaultTextStyle>
+  <p:extLst>
+    <p:ext uri="{EFAFB233-063F-42B5-8137-9DF3F51BA10A}">
+      <p15:sldGuideLst xmlns:p15="http://schemas.microsoft.com/office/powerpoint/2012/main">
+        <p15:guide id="1" orient="horz" pos="2160">
+          <p15:clr>
+            <a:srgbClr val="A4A3A4"/>
+          </p15:clr>
+        </p15:guide>
+        <p15:guide id="2" pos="2880">
+          <p15:clr>
+            <a:srgbClr val="A4A3A4"/>
+          </p15:clr>
+        </p15:guide>
+      </p15:sldGuideLst>
+    </p:ext>
+  </p:extLst>
 </p:presentation>
 </file>
 
@@ -202,7 +219,7 @@
           <a:p>
             <a:fld id="{FD5240AD-D0E5-8743-BED0-4875EEDE37D1}" type="datetimeFigureOut">
               <a:rPr lang="en-US" smtClean="0"/>
-              <a:t>13/09/15</a:t>
+              <a:t>4/12/2018</a:t>
             </a:fld>
             <a:endParaRPr lang="en-US"/>
           </a:p>
@@ -368,7 +385,7 @@
           <a:p>
             <a:fld id="{59F1AF83-5EC3-2645-9357-E8053F4E6264}" type="datetimeFigureOut">
               <a:rPr lang="en-US" smtClean="0"/>
-              <a:t>13/09/15</a:t>
+              <a:t>4/12/2018</a:t>
             </a:fld>
             <a:endParaRPr lang="en-US"/>
           </a:p>
@@ -432,35 +449,35 @@
           <a:p>
             <a:pPr lvl="0"/>
             <a:r>
-              <a:rPr lang="nl-BE" smtClean="0"/>
+              <a:rPr lang="nl-BE"/>
               <a:t>Click to edit Master text styles</a:t>
             </a:r>
           </a:p>
           <a:p>
             <a:pPr lvl="1"/>
             <a:r>
-              <a:rPr lang="nl-BE" smtClean="0"/>
+              <a:rPr lang="nl-BE"/>
               <a:t>Second level</a:t>
             </a:r>
           </a:p>
           <a:p>
             <a:pPr lvl="2"/>
             <a:r>
-              <a:rPr lang="nl-BE" smtClean="0"/>
+              <a:rPr lang="nl-BE"/>
               <a:t>Third level</a:t>
             </a:r>
           </a:p>
           <a:p>
             <a:pPr lvl="3"/>
             <a:r>
-              <a:rPr lang="nl-BE" smtClean="0"/>
+              <a:rPr lang="nl-BE"/>
               <a:t>Fourth level</a:t>
             </a:r>
           </a:p>
           <a:p>
             <a:pPr lvl="4"/>
             <a:r>
-              <a:rPr lang="nl-BE" smtClean="0"/>
+              <a:rPr lang="nl-BE"/>
               <a:t>Fifth level</a:t>
             </a:r>
             <a:endParaRPr lang="en-US"/>
@@ -678,7 +695,7 @@
           <a:lstStyle/>
           <a:p>
             <a:r>
-              <a:rPr lang="nl-BE" smtClean="0"/>
+              <a:rPr lang="nl-BE"/>
               <a:t>Click to edit Master title style</a:t>
             </a:r>
             <a:endParaRPr lang="en-US"/>
@@ -800,7 +817,7 @@
           </a:lstStyle>
           <a:p>
             <a:r>
-              <a:rPr lang="nl-BE" smtClean="0"/>
+              <a:rPr lang="nl-BE"/>
               <a:t>Click to edit Master subtitle style</a:t>
             </a:r>
             <a:endParaRPr lang="en-US"/>
@@ -988,7 +1005,7 @@
           </a:lstStyle>
           <a:p>
             <a:r>
-              <a:rPr lang="nl-BE" sz="1800" dirty="0" smtClean="0">
+              <a:rPr lang="nl-BE" sz="1800" dirty="0">
                 <a:latin typeface="+mn-lt"/>
               </a:rPr>
               <a:t>www.devoxx4kids.com</a:t>
@@ -1054,35 +1071,35 @@
           <a:p>
             <a:pPr lvl="0"/>
             <a:r>
-              <a:rPr lang="nl-BE" dirty="0" smtClean="0"/>
+              <a:rPr lang="nl-BE" dirty="0"/>
               <a:t>Click to edit Master text styles</a:t>
             </a:r>
           </a:p>
           <a:p>
             <a:pPr lvl="1"/>
             <a:r>
-              <a:rPr lang="nl-BE" dirty="0" smtClean="0"/>
+              <a:rPr lang="nl-BE" dirty="0"/>
               <a:t>Second level</a:t>
             </a:r>
           </a:p>
           <a:p>
             <a:pPr lvl="2"/>
             <a:r>
-              <a:rPr lang="nl-BE" dirty="0" smtClean="0"/>
+              <a:rPr lang="nl-BE" dirty="0"/>
               <a:t>Third level</a:t>
             </a:r>
           </a:p>
           <a:p>
             <a:pPr lvl="3"/>
             <a:r>
-              <a:rPr lang="nl-BE" dirty="0" smtClean="0"/>
+              <a:rPr lang="nl-BE" dirty="0"/>
               <a:t>Fourth level</a:t>
             </a:r>
           </a:p>
           <a:p>
             <a:pPr lvl="4"/>
             <a:r>
-              <a:rPr lang="nl-BE" dirty="0" smtClean="0"/>
+              <a:rPr lang="nl-BE" dirty="0"/>
               <a:t>Fifth level</a:t>
             </a:r>
             <a:endParaRPr lang="en-US" dirty="0"/>
@@ -1174,7 +1191,7 @@
           <a:lstStyle/>
           <a:p>
             <a:r>
-              <a:rPr lang="nl-BE" dirty="0" smtClean="0"/>
+              <a:rPr lang="nl-BE" dirty="0"/>
               <a:t>Click to edit Master title style</a:t>
             </a:r>
             <a:endParaRPr lang="en-US" dirty="0"/>
@@ -1242,7 +1259,7 @@
           </a:lstStyle>
           <a:p>
             <a:r>
-              <a:rPr lang="nl-BE" sz="1800" dirty="0" smtClean="0">
+              <a:rPr lang="nl-BE" sz="1800" dirty="0">
                 <a:latin typeface="+mn-lt"/>
               </a:rPr>
               <a:t>www.devoxx4kids.com</a:t>
@@ -1307,7 +1324,7 @@
           <a:lstStyle/>
           <a:p>
             <a:r>
-              <a:rPr lang="nl-BE" dirty="0" smtClean="0"/>
+              <a:rPr lang="nl-BE" dirty="0"/>
               <a:t>Click to edit Master title style</a:t>
             </a:r>
             <a:endParaRPr lang="en-US" dirty="0"/>
@@ -1339,35 +1356,35 @@
           <a:p>
             <a:pPr lvl="0"/>
             <a:r>
-              <a:rPr lang="nl-BE" dirty="0" smtClean="0"/>
+              <a:rPr lang="nl-BE" dirty="0"/>
               <a:t>Click to edit Master text styles</a:t>
             </a:r>
           </a:p>
           <a:p>
             <a:pPr lvl="1"/>
             <a:r>
-              <a:rPr lang="nl-BE" dirty="0" smtClean="0"/>
+              <a:rPr lang="nl-BE" dirty="0"/>
               <a:t>Second level</a:t>
             </a:r>
           </a:p>
           <a:p>
             <a:pPr lvl="2"/>
             <a:r>
-              <a:rPr lang="nl-BE" dirty="0" smtClean="0"/>
+              <a:rPr lang="nl-BE" dirty="0"/>
               <a:t>Third level</a:t>
             </a:r>
           </a:p>
           <a:p>
             <a:pPr lvl="3"/>
             <a:r>
-              <a:rPr lang="nl-BE" dirty="0" smtClean="0"/>
+              <a:rPr lang="nl-BE" dirty="0"/>
               <a:t>Fourth level</a:t>
             </a:r>
           </a:p>
           <a:p>
             <a:pPr lvl="4"/>
             <a:r>
-              <a:rPr lang="nl-BE" dirty="0" smtClean="0"/>
+              <a:rPr lang="nl-BE" dirty="0"/>
               <a:t>Fifth level</a:t>
             </a:r>
             <a:endParaRPr lang="en-US" dirty="0"/>
@@ -1468,7 +1485,7 @@
           </a:lstStyle>
           <a:p>
             <a:r>
-              <a:rPr lang="nl-BE" sz="1800" dirty="0" smtClean="0">
+              <a:rPr lang="nl-BE" sz="1800" dirty="0">
                 <a:latin typeface="+mn-lt"/>
               </a:rPr>
               <a:t>www.devoxx4kids.com</a:t>
@@ -1565,7 +1582,7 @@
           </a:lstStyle>
           <a:p>
             <a:r>
-              <a:rPr lang="nl-BE" smtClean="0"/>
+              <a:rPr lang="nl-BE"/>
               <a:t>Click to edit Master title style</a:t>
             </a:r>
             <a:endParaRPr lang="en-US"/>
@@ -1688,7 +1705,7 @@
           <a:p>
             <a:pPr lvl="0"/>
             <a:r>
-              <a:rPr lang="nl-BE" smtClean="0"/>
+              <a:rPr lang="nl-BE"/>
               <a:t>Click to edit Master text styles</a:t>
             </a:r>
           </a:p>
@@ -1819,7 +1836,7 @@
           </a:lstStyle>
           <a:p>
             <a:r>
-              <a:rPr lang="nl-BE" sz="1800" dirty="0" smtClean="0">
+              <a:rPr lang="nl-BE" sz="1800" dirty="0">
                 <a:latin typeface="+mn-lt"/>
               </a:rPr>
               <a:t>www.devoxx4kids.com</a:t>
@@ -1913,35 +1930,35 @@
           <a:p>
             <a:pPr lvl="0"/>
             <a:r>
-              <a:rPr lang="nl-BE" smtClean="0"/>
+              <a:rPr lang="nl-BE"/>
               <a:t>Click to edit Master text styles</a:t>
             </a:r>
           </a:p>
           <a:p>
             <a:pPr lvl="1"/>
             <a:r>
-              <a:rPr lang="nl-BE" smtClean="0"/>
+              <a:rPr lang="nl-BE"/>
               <a:t>Second level</a:t>
             </a:r>
           </a:p>
           <a:p>
             <a:pPr lvl="2"/>
             <a:r>
-              <a:rPr lang="nl-BE" smtClean="0"/>
+              <a:rPr lang="nl-BE"/>
               <a:t>Third level</a:t>
             </a:r>
           </a:p>
           <a:p>
             <a:pPr lvl="3"/>
             <a:r>
-              <a:rPr lang="nl-BE" smtClean="0"/>
+              <a:rPr lang="nl-BE"/>
               <a:t>Fourth level</a:t>
             </a:r>
           </a:p>
           <a:p>
             <a:pPr lvl="4"/>
             <a:r>
-              <a:rPr lang="nl-BE" smtClean="0"/>
+              <a:rPr lang="nl-BE"/>
               <a:t>Fifth level</a:t>
             </a:r>
             <a:endParaRPr lang="en-US"/>
@@ -2001,35 +2018,35 @@
           <a:p>
             <a:pPr lvl="0"/>
             <a:r>
-              <a:rPr lang="nl-BE" smtClean="0"/>
+              <a:rPr lang="nl-BE"/>
               <a:t>Click to edit Master text styles</a:t>
             </a:r>
           </a:p>
           <a:p>
             <a:pPr lvl="1"/>
             <a:r>
-              <a:rPr lang="nl-BE" smtClean="0"/>
+              <a:rPr lang="nl-BE"/>
               <a:t>Second level</a:t>
             </a:r>
           </a:p>
           <a:p>
             <a:pPr lvl="2"/>
             <a:r>
-              <a:rPr lang="nl-BE" smtClean="0"/>
+              <a:rPr lang="nl-BE"/>
               <a:t>Third level</a:t>
             </a:r>
           </a:p>
           <a:p>
             <a:pPr lvl="3"/>
             <a:r>
-              <a:rPr lang="nl-BE" smtClean="0"/>
+              <a:rPr lang="nl-BE"/>
               <a:t>Fourth level</a:t>
             </a:r>
           </a:p>
           <a:p>
             <a:pPr lvl="4"/>
             <a:r>
-              <a:rPr lang="nl-BE" smtClean="0"/>
+              <a:rPr lang="nl-BE"/>
               <a:t>Fifth level</a:t>
             </a:r>
             <a:endParaRPr lang="en-US"/>
@@ -2121,7 +2138,7 @@
           <a:lstStyle/>
           <a:p>
             <a:r>
-              <a:rPr lang="nl-BE" dirty="0" smtClean="0"/>
+              <a:rPr lang="nl-BE" dirty="0"/>
               <a:t>Click to edit Master title style</a:t>
             </a:r>
             <a:endParaRPr lang="en-US" dirty="0"/>
@@ -2189,7 +2206,7 @@
           </a:lstStyle>
           <a:p>
             <a:r>
-              <a:rPr lang="nl-BE" sz="1800" dirty="0" smtClean="0">
+              <a:rPr lang="nl-BE" sz="1800" dirty="0">
                 <a:latin typeface="+mn-lt"/>
               </a:rPr>
               <a:t>www.devoxx4kids.com</a:t>
@@ -2292,7 +2309,7 @@
           <a:p>
             <a:pPr lvl="0"/>
             <a:r>
-              <a:rPr lang="nl-BE" smtClean="0"/>
+              <a:rPr lang="nl-BE"/>
               <a:t>Click to edit Master text styles</a:t>
             </a:r>
           </a:p>
@@ -2351,35 +2368,35 @@
           <a:p>
             <a:pPr lvl="0"/>
             <a:r>
-              <a:rPr lang="nl-BE" smtClean="0"/>
+              <a:rPr lang="nl-BE"/>
               <a:t>Click to edit Master text styles</a:t>
             </a:r>
           </a:p>
           <a:p>
             <a:pPr lvl="1"/>
             <a:r>
-              <a:rPr lang="nl-BE" smtClean="0"/>
+              <a:rPr lang="nl-BE"/>
               <a:t>Second level</a:t>
             </a:r>
           </a:p>
           <a:p>
             <a:pPr lvl="2"/>
             <a:r>
-              <a:rPr lang="nl-BE" smtClean="0"/>
+              <a:rPr lang="nl-BE"/>
               <a:t>Third level</a:t>
             </a:r>
           </a:p>
           <a:p>
             <a:pPr lvl="3"/>
             <a:r>
-              <a:rPr lang="nl-BE" smtClean="0"/>
+              <a:rPr lang="nl-BE"/>
               <a:t>Fourth level</a:t>
             </a:r>
           </a:p>
           <a:p>
             <a:pPr lvl="4"/>
             <a:r>
-              <a:rPr lang="nl-BE" smtClean="0"/>
+              <a:rPr lang="nl-BE"/>
               <a:t>Fifth level</a:t>
             </a:r>
             <a:endParaRPr lang="en-US"/>
@@ -2448,7 +2465,7 @@
           <a:p>
             <a:pPr lvl="0"/>
             <a:r>
-              <a:rPr lang="nl-BE" smtClean="0"/>
+              <a:rPr lang="nl-BE"/>
               <a:t>Click to edit Master text styles</a:t>
             </a:r>
           </a:p>
@@ -2507,35 +2524,35 @@
           <a:p>
             <a:pPr lvl="0"/>
             <a:r>
-              <a:rPr lang="nl-BE" smtClean="0"/>
+              <a:rPr lang="nl-BE"/>
               <a:t>Click to edit Master text styles</a:t>
             </a:r>
           </a:p>
           <a:p>
             <a:pPr lvl="1"/>
             <a:r>
-              <a:rPr lang="nl-BE" smtClean="0"/>
+              <a:rPr lang="nl-BE"/>
               <a:t>Second level</a:t>
             </a:r>
           </a:p>
           <a:p>
             <a:pPr lvl="2"/>
             <a:r>
-              <a:rPr lang="nl-BE" smtClean="0"/>
+              <a:rPr lang="nl-BE"/>
               <a:t>Third level</a:t>
             </a:r>
           </a:p>
           <a:p>
             <a:pPr lvl="3"/>
             <a:r>
-              <a:rPr lang="nl-BE" smtClean="0"/>
+              <a:rPr lang="nl-BE"/>
               <a:t>Fourth level</a:t>
             </a:r>
           </a:p>
           <a:p>
             <a:pPr lvl="4"/>
             <a:r>
-              <a:rPr lang="nl-BE" smtClean="0"/>
+              <a:rPr lang="nl-BE"/>
               <a:t>Fifth level</a:t>
             </a:r>
             <a:endParaRPr lang="en-US"/>
@@ -2627,7 +2644,7 @@
           <a:lstStyle/>
           <a:p>
             <a:r>
-              <a:rPr lang="nl-BE" dirty="0" smtClean="0"/>
+              <a:rPr lang="nl-BE" dirty="0"/>
               <a:t>Click to edit Master title style</a:t>
             </a:r>
             <a:endParaRPr lang="en-US" dirty="0"/>
@@ -2695,7 +2712,7 @@
           </a:lstStyle>
           <a:p>
             <a:r>
-              <a:rPr lang="nl-BE" sz="1800" dirty="0" smtClean="0">
+              <a:rPr lang="nl-BE" sz="1800" dirty="0">
                 <a:latin typeface="+mn-lt"/>
               </a:rPr>
               <a:t>www.devoxx4kids.com</a:t>
@@ -2821,7 +2838,7 @@
           <a:lstStyle/>
           <a:p>
             <a:r>
-              <a:rPr lang="nl-BE" dirty="0" smtClean="0"/>
+              <a:rPr lang="nl-BE" dirty="0"/>
               <a:t>Click to edit Master title style</a:t>
             </a:r>
             <a:endParaRPr lang="en-US" dirty="0"/>
@@ -2889,7 +2906,7 @@
           </a:lstStyle>
           <a:p>
             <a:r>
-              <a:rPr lang="nl-BE" sz="1800" dirty="0" smtClean="0">
+              <a:rPr lang="nl-BE" sz="1800" dirty="0">
                 <a:latin typeface="+mn-lt"/>
               </a:rPr>
               <a:t>www.devoxx4kids.com</a:t>
@@ -3052,7 +3069,7 @@
           </a:lstStyle>
           <a:p>
             <a:r>
-              <a:rPr lang="nl-BE" sz="1800" dirty="0" smtClean="0">
+              <a:rPr lang="nl-BE" sz="1800" dirty="0">
                 <a:latin typeface="+mn-lt"/>
               </a:rPr>
               <a:t>www.devoxx4kids.com</a:t>
@@ -3121,7 +3138,7 @@
           </a:lstStyle>
           <a:p>
             <a:r>
-              <a:rPr lang="nl-BE" dirty="0" smtClean="0"/>
+              <a:rPr lang="nl-BE" dirty="0"/>
               <a:t>Click to edit Master title style</a:t>
             </a:r>
             <a:endParaRPr lang="en-US" dirty="0"/>
@@ -3181,35 +3198,35 @@
           <a:p>
             <a:pPr lvl="0"/>
             <a:r>
-              <a:rPr lang="nl-BE" smtClean="0"/>
+              <a:rPr lang="nl-BE"/>
               <a:t>Click to edit Master text styles</a:t>
             </a:r>
           </a:p>
           <a:p>
             <a:pPr lvl="1"/>
             <a:r>
-              <a:rPr lang="nl-BE" smtClean="0"/>
+              <a:rPr lang="nl-BE"/>
               <a:t>Second level</a:t>
             </a:r>
           </a:p>
           <a:p>
             <a:pPr lvl="2"/>
             <a:r>
-              <a:rPr lang="nl-BE" smtClean="0"/>
+              <a:rPr lang="nl-BE"/>
               <a:t>Third level</a:t>
             </a:r>
           </a:p>
           <a:p>
             <a:pPr lvl="3"/>
             <a:r>
-              <a:rPr lang="nl-BE" smtClean="0"/>
+              <a:rPr lang="nl-BE"/>
               <a:t>Fourth level</a:t>
             </a:r>
           </a:p>
           <a:p>
             <a:pPr lvl="4"/>
             <a:r>
-              <a:rPr lang="nl-BE" smtClean="0"/>
+              <a:rPr lang="nl-BE"/>
               <a:t>Fifth level</a:t>
             </a:r>
             <a:endParaRPr lang="en-US"/>
@@ -3278,7 +3295,7 @@
           <a:p>
             <a:pPr lvl="0"/>
             <a:r>
-              <a:rPr lang="nl-BE" dirty="0" smtClean="0"/>
+              <a:rPr lang="nl-BE" dirty="0"/>
               <a:t>Click to edit Master text styles</a:t>
             </a:r>
           </a:p>
@@ -3406,7 +3423,7 @@
           </a:lstStyle>
           <a:p>
             <a:r>
-              <a:rPr lang="nl-BE" sz="1800" dirty="0" smtClean="0">
+              <a:rPr lang="nl-BE" sz="1800" dirty="0">
                 <a:latin typeface="+mn-lt"/>
               </a:rPr>
               <a:t>www.devoxx4kids.com</a:t>
@@ -3475,7 +3492,7 @@
           </a:lstStyle>
           <a:p>
             <a:r>
-              <a:rPr lang="nl-BE" dirty="0" smtClean="0"/>
+              <a:rPr lang="nl-BE" dirty="0"/>
               <a:t>Click to edit Master title style</a:t>
             </a:r>
             <a:endParaRPr lang="en-US" dirty="0"/>
@@ -3608,7 +3625,7 @@
           <a:p>
             <a:pPr lvl="0"/>
             <a:r>
-              <a:rPr lang="nl-BE" smtClean="0"/>
+              <a:rPr lang="nl-BE"/>
               <a:t>Click to edit Master text styles</a:t>
             </a:r>
           </a:p>
@@ -3736,7 +3753,7 @@
           </a:lstStyle>
           <a:p>
             <a:r>
-              <a:rPr lang="nl-BE" sz="1800" dirty="0" smtClean="0">
+              <a:rPr lang="nl-BE" sz="1800" dirty="0">
                 <a:latin typeface="+mn-lt"/>
               </a:rPr>
               <a:t>www.devoxx4kids.com</a:t>
@@ -4105,7 +4122,7 @@
           <a:noFill/>
           <a:extLst>
             <a:ext uri="{909E8E84-426E-40dd-AFC4-6F175D3DCCD1}">
-              <a14:hiddenFill xmlns:a14="http://schemas.microsoft.com/office/drawing/2010/main">
+              <a14:hiddenFill xmlns:a14="http://schemas.microsoft.com/office/drawing/2010/main" xmlns="">
                 <a:solidFill>
                   <a:srgbClr val="FFFFFF"/>
                 </a:solidFill>
@@ -4146,7 +4163,7 @@
           <a:noFill/>
           <a:extLst>
             <a:ext uri="{909E8E84-426E-40dd-AFC4-6F175D3DCCD1}">
-              <a14:hiddenFill xmlns:a14="http://schemas.microsoft.com/office/drawing/2010/main">
+              <a14:hiddenFill xmlns:a14="http://schemas.microsoft.com/office/drawing/2010/main" xmlns="">
                 <a:solidFill>
                   <a:srgbClr val="FFFFFF"/>
                 </a:solidFill>
@@ -4171,17 +4188,16 @@
           <a:lstStyle/>
           <a:p>
             <a:r>
-              <a:rPr lang="nl-NL" dirty="0" smtClean="0"/>
+              <a:rPr lang="nl-NL" dirty="0"/>
               <a:t>Programmeren</a:t>
             </a:r>
             <a:br>
-              <a:rPr lang="nl-NL" dirty="0" smtClean="0"/>
+              <a:rPr lang="nl-NL" dirty="0"/>
             </a:br>
             <a:r>
-              <a:rPr lang="nl-NL" dirty="0" smtClean="0"/>
+              <a:rPr lang="nl-NL" dirty="0"/>
               <a:t>Balloon Pop</a:t>
             </a:r>
-            <a:endParaRPr lang="nl-NL" dirty="0"/>
           </a:p>
         </p:txBody>
       </p:sp>
@@ -4195,13 +4211,6 @@
   <p:clrMapOvr>
     <a:masterClrMapping/>
   </p:clrMapOvr>
-  <p:timing>
-    <p:tnLst>
-      <p:par>
-        <p:cTn xmlns:p14="http://schemas.microsoft.com/office/powerpoint/2010/main" id="1" dur="indefinite" restart="never" nodeType="tmRoot"/>
-      </p:par>
-    </p:tnLst>
-  </p:timing>
 </p:sld>
 </file>
 
@@ -4244,23 +4253,19 @@
           <a:p>
             <a:pPr algn="l"/>
             <a:r>
-              <a:rPr lang="en-US" dirty="0" err="1" smtClean="0">
+              <a:rPr lang="en-US" dirty="0" err="1">
                 <a:latin typeface="Comic Sans MS"/>
                 <a:cs typeface="Comic Sans MS"/>
               </a:rPr>
               <a:t>BalloonPop</a:t>
             </a:r>
             <a:r>
-              <a:rPr lang="en-US" dirty="0" smtClean="0">
+              <a:rPr lang="en-US" dirty="0">
                 <a:latin typeface="Comic Sans MS"/>
                 <a:cs typeface="Comic Sans MS"/>
               </a:rPr>
               <a:t> </a:t>
             </a:r>
-            <a:endParaRPr lang="en-US" dirty="0">
-              <a:latin typeface="Comic Sans MS"/>
-              <a:cs typeface="Comic Sans MS"/>
-            </a:endParaRPr>
           </a:p>
         </p:txBody>
       </p:sp>
@@ -4326,27 +4331,27 @@
           <a:noFill/>
         </p:spPr>
         <p:txBody>
-          <a:bodyPr wrap="square" rtlCol="0">
+          <a:bodyPr wrap="square" rtlCol="0" anchor="t">
             <a:spAutoFit/>
           </a:bodyPr>
           <a:lstStyle/>
           <a:p>
             <a:r>
-              <a:rPr lang="nl-NL" dirty="0" smtClean="0">
+              <a:rPr lang="nl-NL" dirty="0">
                 <a:latin typeface="Comic Sans MS"/>
                 <a:cs typeface="Comic Sans MS"/>
               </a:rPr>
               <a:t>Nu je de basis van scratch en de </a:t>
             </a:r>
             <a:r>
-              <a:rPr lang="nl-NL" dirty="0" err="1" smtClean="0">
+              <a:rPr lang="nl-NL" dirty="0" err="1">
                 <a:latin typeface="Comic Sans MS"/>
                 <a:cs typeface="Comic Sans MS"/>
               </a:rPr>
               <a:t>leap</a:t>
             </a:r>
             <a:r>
-              <a:rPr lang="nl-NL" dirty="0" smtClean="0">
+              <a:rPr lang="nl-NL" dirty="0">
                 <a:latin typeface="Comic Sans MS"/>
                 <a:cs typeface="Comic Sans MS"/>
               </a:rPr>
@@ -4361,21 +4366,21 @@
           </a:p>
           <a:p>
             <a:r>
-              <a:rPr lang="nl-NL" dirty="0" smtClean="0">
+              <a:rPr lang="nl-NL" dirty="0">
                 <a:latin typeface="Comic Sans MS"/>
                 <a:cs typeface="Comic Sans MS"/>
               </a:rPr>
               <a:t>Het is de bedoeling om met een rode </a:t>
             </a:r>
             <a:r>
-              <a:rPr lang="nl-NL" dirty="0" err="1" smtClean="0">
+              <a:rPr lang="nl-NL" dirty="0" err="1">
                 <a:latin typeface="Comic Sans MS"/>
                 <a:cs typeface="Comic Sans MS"/>
               </a:rPr>
               <a:t>sprite</a:t>
             </a:r>
             <a:r>
-              <a:rPr lang="nl-NL" dirty="0" smtClean="0">
+              <a:rPr lang="nl-NL" dirty="0">
                 <a:latin typeface="Comic Sans MS"/>
                 <a:cs typeface="Comic Sans MS"/>
               </a:rPr>
@@ -4383,35 +4388,28 @@
             </a:r>
           </a:p>
           <a:p>
-            <a:endParaRPr lang="nl-NL" dirty="0" smtClean="0">
+            <a:endParaRPr lang="nl-NL" dirty="0">
               <a:latin typeface="Comic Sans MS"/>
               <a:cs typeface="Comic Sans MS"/>
             </a:endParaRPr>
           </a:p>
           <a:p>
             <a:r>
-              <a:rPr lang="nl-NL" dirty="0" smtClean="0">
+              <a:rPr lang="nl-NL" dirty="0">
                 <a:latin typeface="Comic Sans MS"/>
                 <a:cs typeface="Comic Sans MS"/>
               </a:rPr>
-              <a:t>Hiervoor moet je het project </a:t>
-            </a:r>
-            <a:r>
-              <a:rPr lang="nl-NL" smtClean="0">
+              <a:t>Hiervoor moet je het project ‘</a:t>
+            </a:r>
+            <a:r>
+              <a:rPr lang="nl-NL" dirty="0" err="1">
                 <a:latin typeface="Comic Sans MS"/>
                 <a:cs typeface="Comic Sans MS"/>
               </a:rPr>
-              <a:t>‘</a:t>
-            </a:r>
-            <a:r>
-              <a:rPr lang="nl-NL" smtClean="0">
-                <a:latin typeface="Comic Sans MS"/>
-                <a:cs typeface="Comic Sans MS"/>
-              </a:rPr>
-              <a:t>BalloonPop.sb2</a:t>
-            </a:r>
-            <a:r>
-              <a:rPr lang="nl-NL" dirty="0" smtClean="0">
+              <a:t>BalloonPop.sbx</a:t>
+            </a:r>
+            <a:r>
+              <a:rPr lang="nl-NL" dirty="0">
                 <a:latin typeface="Comic Sans MS"/>
                 <a:cs typeface="Comic Sans MS"/>
               </a:rPr>
@@ -4465,13 +4463,6 @@
   <p:clrMapOvr>
     <a:masterClrMapping/>
   </p:clrMapOvr>
-  <p:timing>
-    <p:tnLst>
-      <p:par>
-        <p:cTn xmlns:p14="http://schemas.microsoft.com/office/powerpoint/2010/main" id="1" dur="indefinite" restart="never" nodeType="tmRoot"/>
-      </p:par>
-    </p:tnLst>
-  </p:timing>
 </p:sld>
 </file>
 
@@ -4514,16 +4505,12 @@
           <a:p>
             <a:pPr algn="l"/>
             <a:r>
-              <a:rPr lang="en-US" dirty="0" smtClean="0">
+              <a:rPr lang="en-US" dirty="0">
                 <a:latin typeface="Comic Sans MS"/>
                 <a:cs typeface="Comic Sans MS"/>
               </a:rPr>
               <a:t>Balloon Pop </a:t>
             </a:r>
-            <a:endParaRPr lang="en-US" dirty="0">
-              <a:latin typeface="Comic Sans MS"/>
-              <a:cs typeface="Comic Sans MS"/>
-            </a:endParaRPr>
           </a:p>
         </p:txBody>
       </p:sp>
@@ -4569,10 +4556,9 @@
           <a:p>
             <a:pPr algn="ctr"/>
             <a:r>
-              <a:rPr lang="en-US" dirty="0" smtClean="0"/>
+              <a:rPr lang="en-US" dirty="0"/>
               <a:t>Balloon Pop</a:t>
             </a:r>
-            <a:endParaRPr lang="en-US" dirty="0"/>
           </a:p>
         </p:txBody>
       </p:sp>
@@ -4599,35 +4585,35 @@
           <a:lstStyle/>
           <a:p>
             <a:r>
-              <a:rPr lang="nl-NL" dirty="0" smtClean="0">
+              <a:rPr lang="nl-NL" dirty="0">
                 <a:latin typeface="Comic Sans MS"/>
                 <a:cs typeface="Comic Sans MS"/>
               </a:rPr>
               <a:t>We gaan een </a:t>
             </a:r>
             <a:r>
-              <a:rPr lang="nl-NL" dirty="0" err="1" smtClean="0">
+              <a:rPr lang="nl-NL" dirty="0" err="1">
                 <a:latin typeface="Comic Sans MS"/>
                 <a:cs typeface="Comic Sans MS"/>
               </a:rPr>
               <a:t>sprite</a:t>
             </a:r>
             <a:r>
-              <a:rPr lang="nl-NL" dirty="0" smtClean="0">
+              <a:rPr lang="nl-NL" dirty="0">
                 <a:latin typeface="Comic Sans MS"/>
                 <a:cs typeface="Comic Sans MS"/>
               </a:rPr>
               <a:t> laten bewegen met de </a:t>
             </a:r>
             <a:r>
-              <a:rPr lang="nl-NL" dirty="0" err="1" smtClean="0">
+              <a:rPr lang="nl-NL" dirty="0" err="1">
                 <a:latin typeface="Comic Sans MS"/>
                 <a:cs typeface="Comic Sans MS"/>
               </a:rPr>
               <a:t>leap</a:t>
             </a:r>
             <a:r>
-              <a:rPr lang="nl-NL" dirty="0" smtClean="0">
+              <a:rPr lang="nl-NL" dirty="0">
                 <a:latin typeface="Comic Sans MS"/>
                 <a:cs typeface="Comic Sans MS"/>
               </a:rPr>
@@ -4642,21 +4628,21 @@
           </a:p>
           <a:p>
             <a:r>
-              <a:rPr lang="nl-NL" dirty="0" smtClean="0">
+              <a:rPr lang="nl-NL" dirty="0">
                 <a:latin typeface="Comic Sans MS"/>
                 <a:cs typeface="Comic Sans MS"/>
               </a:rPr>
               <a:t>Kies een </a:t>
             </a:r>
             <a:r>
-              <a:rPr lang="nl-NL" dirty="0" err="1" smtClean="0">
+              <a:rPr lang="nl-NL" dirty="0" err="1">
                 <a:latin typeface="Comic Sans MS"/>
                 <a:cs typeface="Comic Sans MS"/>
               </a:rPr>
               <a:t>sprite</a:t>
             </a:r>
             <a:r>
-              <a:rPr lang="nl-NL" dirty="0" smtClean="0">
+              <a:rPr lang="nl-NL" dirty="0">
                 <a:latin typeface="Comic Sans MS"/>
                 <a:cs typeface="Comic Sans MS"/>
               </a:rPr>
@@ -4664,14 +4650,14 @@
             </a:r>
           </a:p>
           <a:p>
-            <a:endParaRPr lang="nl-NL" dirty="0" smtClean="0">
+            <a:endParaRPr lang="nl-NL" dirty="0">
               <a:latin typeface="Comic Sans MS"/>
               <a:cs typeface="Comic Sans MS"/>
             </a:endParaRPr>
           </a:p>
           <a:p>
             <a:r>
-              <a:rPr lang="nl-NL" dirty="0" smtClean="0">
+              <a:rPr lang="nl-NL" dirty="0">
                 <a:latin typeface="Comic Sans MS"/>
                 <a:cs typeface="Comic Sans MS"/>
               </a:rPr>
@@ -4679,42 +4665,42 @@
             </a:r>
           </a:p>
           <a:p>
-            <a:endParaRPr lang="nl-NL" dirty="0" smtClean="0">
+            <a:endParaRPr lang="nl-NL" dirty="0">
               <a:latin typeface="Comic Sans MS"/>
               <a:cs typeface="Comic Sans MS"/>
             </a:endParaRPr>
           </a:p>
           <a:p>
             <a:r>
-              <a:rPr lang="nl-NL" dirty="0" smtClean="0">
+              <a:rPr lang="nl-NL" dirty="0">
                 <a:latin typeface="Comic Sans MS"/>
                 <a:cs typeface="Comic Sans MS"/>
               </a:rPr>
               <a:t>Zorg dat je de </a:t>
             </a:r>
             <a:r>
-              <a:rPr lang="nl-NL" dirty="0" err="1" smtClean="0">
+              <a:rPr lang="nl-NL" dirty="0" err="1">
                 <a:latin typeface="Comic Sans MS"/>
                 <a:cs typeface="Comic Sans MS"/>
               </a:rPr>
               <a:t>sprite</a:t>
             </a:r>
             <a:r>
-              <a:rPr lang="nl-NL" dirty="0" smtClean="0">
+              <a:rPr lang="nl-NL" dirty="0">
                 <a:latin typeface="Comic Sans MS"/>
                 <a:cs typeface="Comic Sans MS"/>
               </a:rPr>
               <a:t> kunt besturen met de </a:t>
             </a:r>
             <a:r>
-              <a:rPr lang="nl-NL" dirty="0" err="1" smtClean="0">
+              <a:rPr lang="nl-NL" dirty="0" err="1">
                 <a:latin typeface="Comic Sans MS"/>
                 <a:cs typeface="Comic Sans MS"/>
               </a:rPr>
               <a:t>leap</a:t>
             </a:r>
             <a:r>
-              <a:rPr lang="nl-NL" dirty="0" smtClean="0">
+              <a:rPr lang="nl-NL" dirty="0">
                 <a:latin typeface="Comic Sans MS"/>
                 <a:cs typeface="Comic Sans MS"/>
               </a:rPr>
@@ -4745,7 +4731,7 @@
         </p:blipFill>
         <p:spPr>
           <a:xfrm>
-            <a:off x="2983570" y="4190356"/>
+            <a:off x="3051954" y="4161049"/>
             <a:ext cx="202432" cy="228836"/>
           </a:xfrm>
           <a:prstGeom prst="rect">
@@ -4755,7 +4741,43 @@
       </p:pic>
       <p:pic>
         <p:nvPicPr>
-          <p:cNvPr id="10" name="Tijdelijke aanduiding voor inhoud 9"/>
+          <p:cNvPr id="13" name="Picture 13" descr="A screenshot of a cell phone&#10;&#10;Description generated with very high confidence">
+            <a:extLst>
+              <a:ext uri="{FF2B5EF4-FFF2-40B4-BE49-F238E27FC236}">
+                <a16:creationId xmlns:a16="http://schemas.microsoft.com/office/drawing/2014/main" id="{2C84C946-6D95-4A32-8197-BFE7E21BACFE}"/>
+              </a:ext>
+            </a:extLst>
+          </p:cNvPr>
+          <p:cNvPicPr>
+            <a:picLocks noChangeAspect="1"/>
+          </p:cNvPicPr>
+          <p:nvPr/>
+        </p:nvPicPr>
+        <p:blipFill>
+          <a:blip r:embed="rId3"/>
+          <a:stretch>
+            <a:fillRect/>
+          </a:stretch>
+        </p:blipFill>
+        <p:spPr>
+          <a:xfrm>
+            <a:off x="4353174" y="1514549"/>
+            <a:ext cx="2948354" cy="3623750"/>
+          </a:xfrm>
+          <a:prstGeom prst="rect">
+            <a:avLst/>
+          </a:prstGeom>
+        </p:spPr>
+      </p:pic>
+      <p:pic>
+        <p:nvPicPr>
+          <p:cNvPr id="9" name="Picture 10" descr="A screenshot of a cell phone&#10;&#10;Description generated with high confidence">
+            <a:extLst>
+              <a:ext uri="{FF2B5EF4-FFF2-40B4-BE49-F238E27FC236}">
+                <a16:creationId xmlns:a16="http://schemas.microsoft.com/office/drawing/2014/main" id="{CE41AE23-D4C7-4843-A110-AC0E779B2015}"/>
+              </a:ext>
+            </a:extLst>
+          </p:cNvPr>
           <p:cNvPicPr>
             <a:picLocks noGrp="1" noChangeAspect="1"/>
           </p:cNvPicPr>
@@ -4763,39 +4785,6 @@
             <p:ph idx="1"/>
           </p:nvPr>
         </p:nvPicPr>
-        <p:blipFill rotWithShape="1">
-          <a:blip r:embed="rId3"/>
-          <a:srcRect l="-24561" r="-24561"/>
-          <a:stretch/>
-        </p:blipFill>
-        <p:spPr>
-          <a:xfrm>
-            <a:off x="3480916" y="1475325"/>
-            <a:ext cx="6453894" cy="3549393"/>
-          </a:xfrm>
-          <a:prstGeom prst="rect">
-            <a:avLst/>
-          </a:prstGeom>
-          <a:ln>
-            <a:noFill/>
-          </a:ln>
-          <a:effectLst>
-            <a:outerShdw blurRad="292100" dist="139700" dir="2700000" algn="tl" rotWithShape="0">
-              <a:srgbClr val="333333">
-                <a:alpha val="65000"/>
-              </a:srgbClr>
-            </a:outerShdw>
-          </a:effectLst>
-        </p:spPr>
-      </p:pic>
-      <p:pic>
-        <p:nvPicPr>
-          <p:cNvPr id="12" name="Afbeelding 11"/>
-          <p:cNvPicPr>
-            <a:picLocks noChangeAspect="1"/>
-          </p:cNvPicPr>
-          <p:nvPr/>
-        </p:nvPicPr>
         <p:blipFill>
           <a:blip r:embed="rId4"/>
           <a:stretch>
@@ -4804,8 +4793,8 @@
         </p:blipFill>
         <p:spPr>
           <a:xfrm>
-            <a:off x="4467579" y="4565650"/>
-            <a:ext cx="4330700" cy="1790700"/>
+            <a:off x="4320691" y="4753401"/>
+            <a:ext cx="3579936" cy="1208943"/>
           </a:xfrm>
           <a:prstGeom prst="rect">
             <a:avLst/>
@@ -4822,13 +4811,6 @@
   <p:clrMapOvr>
     <a:masterClrMapping/>
   </p:clrMapOvr>
-  <p:timing>
-    <p:tnLst>
-      <p:par>
-        <p:cTn xmlns:p14="http://schemas.microsoft.com/office/powerpoint/2010/main" id="1" dur="indefinite" restart="never" nodeType="tmRoot"/>
-      </p:par>
-    </p:tnLst>
-  </p:timing>
 </p:sld>
 </file>
 
@@ -4871,16 +4853,12 @@
           <a:p>
             <a:pPr algn="l"/>
             <a:r>
-              <a:rPr lang="en-US" dirty="0" smtClean="0">
+              <a:rPr lang="en-US" dirty="0">
                 <a:latin typeface="Comic Sans MS"/>
                 <a:cs typeface="Comic Sans MS"/>
               </a:rPr>
               <a:t>Balloon Pop </a:t>
             </a:r>
-            <a:endParaRPr lang="en-US" dirty="0">
-              <a:latin typeface="Comic Sans MS"/>
-              <a:cs typeface="Comic Sans MS"/>
-            </a:endParaRPr>
           </a:p>
         </p:txBody>
       </p:sp>
@@ -4926,10 +4904,9 @@
           <a:p>
             <a:pPr algn="ctr"/>
             <a:r>
-              <a:rPr lang="en-US" dirty="0" smtClean="0"/>
+              <a:rPr lang="en-US" dirty="0"/>
               <a:t>Balloon Pop</a:t>
             </a:r>
-            <a:endParaRPr lang="en-US" dirty="0"/>
           </a:p>
         </p:txBody>
       </p:sp>
@@ -4942,7 +4919,7 @@
         <p:spPr>
           <a:xfrm>
             <a:off x="408057" y="1390952"/>
-            <a:ext cx="3763582" cy="5355313"/>
+            <a:ext cx="3763582" cy="5078313"/>
           </a:xfrm>
           <a:prstGeom prst="rect">
             <a:avLst/>
@@ -4950,27 +4927,27 @@
           <a:noFill/>
         </p:spPr>
         <p:txBody>
-          <a:bodyPr wrap="square" rtlCol="0">
+          <a:bodyPr wrap="square" rtlCol="0" anchor="t">
             <a:spAutoFit/>
           </a:bodyPr>
           <a:lstStyle/>
           <a:p>
             <a:r>
-              <a:rPr lang="nl-NL" dirty="0" smtClean="0">
+              <a:rPr lang="nl-NL" dirty="0">
                 <a:latin typeface="Comic Sans MS"/>
                 <a:cs typeface="Comic Sans MS"/>
               </a:rPr>
               <a:t>Voeg een ballon </a:t>
             </a:r>
             <a:r>
-              <a:rPr lang="nl-NL" dirty="0" err="1" smtClean="0">
+              <a:rPr lang="nl-NL" dirty="0" err="1">
                 <a:latin typeface="Comic Sans MS"/>
                 <a:cs typeface="Comic Sans MS"/>
               </a:rPr>
               <a:t>sprite</a:t>
             </a:r>
             <a:r>
-              <a:rPr lang="nl-NL" dirty="0" smtClean="0">
+              <a:rPr lang="nl-NL" dirty="0">
                 <a:latin typeface="Comic Sans MS"/>
                 <a:cs typeface="Comic Sans MS"/>
               </a:rPr>
@@ -4985,7 +4962,7 @@
           </a:p>
           <a:p>
             <a:r>
-              <a:rPr lang="nl-NL" dirty="0" smtClean="0">
+              <a:rPr lang="nl-NL" dirty="0">
                 <a:latin typeface="Comic Sans MS"/>
                 <a:cs typeface="Comic Sans MS"/>
               </a:rPr>
@@ -5000,7 +4977,7 @@
           </a:p>
           <a:p>
             <a:r>
-              <a:rPr lang="nl-NL" dirty="0" smtClean="0">
+              <a:rPr lang="nl-NL" dirty="0">
                 <a:latin typeface="Comic Sans MS"/>
                 <a:cs typeface="Comic Sans MS"/>
               </a:rPr>
@@ -5015,18 +4992,12 @@
           </a:p>
           <a:p>
             <a:r>
-              <a:rPr lang="nl-NL" dirty="0" smtClean="0">
+              <a:rPr lang="nl-NL" dirty="0">
                 <a:latin typeface="Comic Sans MS"/>
-                <a:cs typeface="Comic Sans MS"/>
               </a:rPr>
-              <a:t>Helemaal naar boven is de ballon weg. Probeer de startpositie van de ballon aan te passen zodat deze onder aan het scherm begint op een willekeurige horizontale positie.</a:t>
-            </a:r>
-          </a:p>
-          <a:p>
-            <a:endParaRPr lang="nl-NL" dirty="0" smtClean="0">
-              <a:latin typeface="Comic Sans MS"/>
-              <a:cs typeface="Comic Sans MS"/>
-            </a:endParaRPr>
+              <a:t>Helemaal naar boven blijft de ballon steken. Dit gaan we later aanpassen.</a:t>
+            </a:r>
+            <a:endParaRPr lang="nl-NL" dirty="0"/>
           </a:p>
           <a:p>
             <a:endParaRPr lang="nl-NL" dirty="0">
@@ -5040,11 +5011,35 @@
               <a:cs typeface="Comic Sans MS"/>
             </a:endParaRPr>
           </a:p>
+          <a:p>
+            <a:endParaRPr lang="nl-NL" dirty="0">
+              <a:latin typeface="Comic Sans MS"/>
+              <a:cs typeface="Comic Sans MS"/>
+            </a:endParaRPr>
+          </a:p>
+          <a:p>
+            <a:endParaRPr lang="nl-NL" dirty="0">
+              <a:latin typeface="Comic Sans MS"/>
+              <a:cs typeface="Comic Sans MS"/>
+            </a:endParaRPr>
+          </a:p>
+          <a:p>
+            <a:endParaRPr lang="nl-NL" dirty="0">
+              <a:latin typeface="Comic Sans MS"/>
+              <a:cs typeface="Comic Sans MS"/>
+            </a:endParaRPr>
+          </a:p>
         </p:txBody>
       </p:sp>
       <p:pic>
         <p:nvPicPr>
-          <p:cNvPr id="13" name="Afbeelding 12"/>
+          <p:cNvPr id="3" name="Picture 5" descr="A close up of a sign&#10;&#10;Description generated with high confidence">
+            <a:extLst>
+              <a:ext uri="{FF2B5EF4-FFF2-40B4-BE49-F238E27FC236}">
+                <a16:creationId xmlns:a16="http://schemas.microsoft.com/office/drawing/2014/main" id="{251E52FF-4089-4066-A7BB-34A0C7021DC3}"/>
+              </a:ext>
+            </a:extLst>
+          </p:cNvPr>
           <p:cNvPicPr>
             <a:picLocks noChangeAspect="1"/>
           </p:cNvPicPr>
@@ -5058,8 +5053,8 @@
         </p:blipFill>
         <p:spPr>
           <a:xfrm>
-            <a:off x="4502150" y="1598458"/>
-            <a:ext cx="3035300" cy="1473200"/>
+            <a:off x="4392246" y="1472797"/>
+            <a:ext cx="2743200" cy="1313793"/>
           </a:xfrm>
           <a:prstGeom prst="rect">
             <a:avLst/>
@@ -5068,7 +5063,13 @@
       </p:pic>
       <p:pic>
         <p:nvPicPr>
-          <p:cNvPr id="14" name="Afbeelding 13"/>
+          <p:cNvPr id="8" name="Picture 8" descr="A screenshot of a cell phone&#10;&#10;Description generated with high confidence">
+            <a:extLst>
+              <a:ext uri="{FF2B5EF4-FFF2-40B4-BE49-F238E27FC236}">
+                <a16:creationId xmlns:a16="http://schemas.microsoft.com/office/drawing/2014/main" id="{187B9ADD-41C6-4781-94FC-6D065EEFE953}"/>
+              </a:ext>
+            </a:extLst>
+          </p:cNvPr>
           <p:cNvPicPr>
             <a:picLocks noChangeAspect="1"/>
           </p:cNvPicPr>
@@ -5082,32 +5083,8 @@
         </p:blipFill>
         <p:spPr>
           <a:xfrm>
-            <a:off x="4476750" y="3212577"/>
-            <a:ext cx="4152900" cy="1384300"/>
-          </a:xfrm>
-          <a:prstGeom prst="rect">
-            <a:avLst/>
-          </a:prstGeom>
-        </p:spPr>
-      </p:pic>
-      <p:pic>
-        <p:nvPicPr>
-          <p:cNvPr id="15" name="Afbeelding 14"/>
-          <p:cNvPicPr>
-            <a:picLocks noChangeAspect="1"/>
-          </p:cNvPicPr>
-          <p:nvPr/>
-        </p:nvPicPr>
-        <p:blipFill>
-          <a:blip r:embed="rId4"/>
-          <a:stretch>
-            <a:fillRect/>
-          </a:stretch>
-        </p:blipFill>
-        <p:spPr>
-          <a:xfrm>
-            <a:off x="4458909" y="4954974"/>
-            <a:ext cx="4406900" cy="495300"/>
+            <a:off x="4392246" y="3112121"/>
+            <a:ext cx="3954584" cy="1591142"/>
           </a:xfrm>
           <a:prstGeom prst="rect">
             <a:avLst/>
@@ -5124,13 +5101,6 @@
   <p:clrMapOvr>
     <a:masterClrMapping/>
   </p:clrMapOvr>
-  <p:timing>
-    <p:tnLst>
-      <p:par>
-        <p:cTn xmlns:p14="http://schemas.microsoft.com/office/powerpoint/2010/main" id="1" dur="indefinite" restart="never" nodeType="tmRoot"/>
-      </p:par>
-    </p:tnLst>
-  </p:timing>
 </p:sld>
 </file>
 
@@ -5173,16 +5143,12 @@
           <a:p>
             <a:pPr algn="l"/>
             <a:r>
-              <a:rPr lang="en-US" dirty="0" smtClean="0">
+              <a:rPr lang="en-US" dirty="0">
                 <a:latin typeface="Comic Sans MS"/>
                 <a:cs typeface="Comic Sans MS"/>
               </a:rPr>
               <a:t>Balloon Pop </a:t>
             </a:r>
-            <a:endParaRPr lang="en-US" dirty="0">
-              <a:latin typeface="Comic Sans MS"/>
-              <a:cs typeface="Comic Sans MS"/>
-            </a:endParaRPr>
           </a:p>
         </p:txBody>
       </p:sp>
@@ -5228,10 +5194,9 @@
           <a:p>
             <a:pPr algn="ctr"/>
             <a:r>
-              <a:rPr lang="en-US" dirty="0" smtClean="0"/>
+              <a:rPr lang="en-US" dirty="0"/>
               <a:t>Balloon Pop</a:t>
             </a:r>
-            <a:endParaRPr lang="en-US" dirty="0"/>
           </a:p>
         </p:txBody>
       </p:sp>
@@ -5243,8 +5208,8 @@
         </p:nvSpPr>
         <p:spPr>
           <a:xfrm>
-            <a:off x="408057" y="1390952"/>
-            <a:ext cx="3587446" cy="2308324"/>
+            <a:off x="222442" y="1420261"/>
+            <a:ext cx="4056369" cy="3416320"/>
           </a:xfrm>
           <a:prstGeom prst="rect">
             <a:avLst/>
@@ -5252,28 +5217,43 @@
           <a:noFill/>
         </p:spPr>
         <p:txBody>
-          <a:bodyPr wrap="square" rtlCol="0">
+          <a:bodyPr wrap="square" rtlCol="0" anchor="t">
             <a:spAutoFit/>
           </a:bodyPr>
           <a:lstStyle/>
           <a:p>
             <a:r>
-              <a:rPr lang="nl-NL" dirty="0" smtClean="0">
+              <a:rPr lang="nl-NL" dirty="0">
                 <a:latin typeface="Comic Sans MS"/>
-                <a:cs typeface="Comic Sans MS"/>
               </a:rPr>
               <a:t>We hebben meer ballonnen nodig!</a:t>
             </a:r>
-          </a:p>
-          <a:p>
-            <a:endParaRPr lang="nl-NL" dirty="0" smtClean="0">
+            <a:endParaRPr lang="en-US" dirty="0"/>
+          </a:p>
+          <a:p>
+            <a:endParaRPr lang="nl-NL" dirty="0">
               <a:latin typeface="Comic Sans MS"/>
               <a:cs typeface="Comic Sans MS"/>
             </a:endParaRPr>
           </a:p>
           <a:p>
             <a:r>
-              <a:rPr lang="nl-NL" dirty="0" smtClean="0">
+              <a:rPr lang="nl-NL" dirty="0">
+                <a:latin typeface="Comic Sans MS"/>
+              </a:rPr>
+              <a:t>We gaan de startpositie van de ballonnen aan passen zodat deze onder aan het scherm beginnen op een willekeurige horizontale positie.</a:t>
+            </a:r>
+            <a:endParaRPr lang="nl-NL" dirty="0"/>
+          </a:p>
+          <a:p>
+            <a:endParaRPr lang="nl-NL" dirty="0">
+              <a:latin typeface="Comic Sans MS"/>
+              <a:cs typeface="Comic Sans MS"/>
+            </a:endParaRPr>
+          </a:p>
+          <a:p>
+            <a:r>
+              <a:rPr lang="nl-NL" dirty="0">
                 <a:latin typeface="Comic Sans MS"/>
                 <a:cs typeface="Comic Sans MS"/>
               </a:rPr>
@@ -5282,89 +5262,45 @@
           </a:p>
           <a:p>
             <a:r>
-              <a:rPr lang="nl-NL" dirty="0" smtClean="0">
+              <a:rPr lang="nl-NL" dirty="0">
                 <a:latin typeface="Comic Sans MS"/>
                 <a:cs typeface="Comic Sans MS"/>
               </a:rPr>
-              <a:t>Ballonnen verschijnen. </a:t>
-            </a:r>
-          </a:p>
-          <a:p>
-            <a:endParaRPr lang="nl-NL" dirty="0" smtClean="0">
+              <a:t>ballonnen verschijnen. </a:t>
+            </a:r>
+          </a:p>
+          <a:p>
+            <a:endParaRPr lang="nl-NL" dirty="0">
               <a:latin typeface="Comic Sans MS"/>
               <a:cs typeface="Comic Sans MS"/>
             </a:endParaRPr>
           </a:p>
           <a:p>
             <a:r>
-              <a:rPr lang="nl-NL" dirty="0" smtClean="0">
+              <a:rPr lang="nl-NL" dirty="0">
                 <a:latin typeface="Comic Sans MS"/>
                 <a:cs typeface="Comic Sans MS"/>
               </a:rPr>
               <a:t>Dat ziet er geinig uit!</a:t>
             </a:r>
+          </a:p>
+          <a:p>
             <a:endParaRPr lang="nl-NL" dirty="0">
               <a:latin typeface="Comic Sans MS"/>
               <a:cs typeface="Comic Sans MS"/>
             </a:endParaRPr>
           </a:p>
-          <a:p>
-            <a:endParaRPr lang="nl-NL" dirty="0" smtClean="0">
-              <a:latin typeface="Comic Sans MS"/>
-              <a:cs typeface="Comic Sans MS"/>
-            </a:endParaRPr>
-          </a:p>
-        </p:txBody>
-      </p:sp>
-      <p:sp>
-        <p:nvSpPr>
-          <p:cNvPr id="11" name="TextBox 6"/>
-          <p:cNvSpPr txBox="1"/>
-          <p:nvPr/>
-        </p:nvSpPr>
-        <p:spPr>
-          <a:xfrm>
-            <a:off x="352427" y="4433640"/>
-            <a:ext cx="3763582" cy="923330"/>
-          </a:xfrm>
-          <a:prstGeom prst="rect">
-            <a:avLst/>
-          </a:prstGeom>
-          <a:noFill/>
-        </p:spPr>
-        <p:txBody>
-          <a:bodyPr wrap="square" rtlCol="0">
-            <a:spAutoFit/>
-          </a:bodyPr>
-          <a:lstStyle/>
-          <a:p>
-            <a:r>
-              <a:rPr lang="nl-NL" dirty="0" smtClean="0">
-                <a:latin typeface="Comic Sans MS"/>
-                <a:cs typeface="Comic Sans MS"/>
-              </a:rPr>
-              <a:t>Als de rode </a:t>
-            </a:r>
-            <a:r>
-              <a:rPr lang="nl-NL" dirty="0" err="1" smtClean="0">
-                <a:latin typeface="Comic Sans MS"/>
-                <a:cs typeface="Comic Sans MS"/>
-              </a:rPr>
-              <a:t>sprite</a:t>
-            </a:r>
-            <a:r>
-              <a:rPr lang="nl-NL" dirty="0" smtClean="0">
-                <a:latin typeface="Comic Sans MS"/>
-                <a:cs typeface="Comic Sans MS"/>
-              </a:rPr>
-              <a:t> de ballon raakt moet hij verdwijnen met een plop geluidje.</a:t>
-            </a:r>
-          </a:p>
         </p:txBody>
       </p:sp>
       <p:pic>
         <p:nvPicPr>
-          <p:cNvPr id="8" name="Afbeelding 7"/>
+          <p:cNvPr id="3" name="Picture 5" descr="A picture containing sky, screenshot, monitor&#10;&#10;Description generated with very high confidence">
+            <a:extLst>
+              <a:ext uri="{FF2B5EF4-FFF2-40B4-BE49-F238E27FC236}">
+                <a16:creationId xmlns:a16="http://schemas.microsoft.com/office/drawing/2014/main" id="{B0979162-3099-427B-BFB5-3247988770F2}"/>
+              </a:ext>
+            </a:extLst>
+          </p:cNvPr>
           <p:cNvPicPr>
             <a:picLocks noChangeAspect="1"/>
           </p:cNvPicPr>
@@ -5378,8 +5314,8 @@
         </p:blipFill>
         <p:spPr>
           <a:xfrm>
-            <a:off x="4139943" y="1390952"/>
-            <a:ext cx="4855219" cy="2952498"/>
+            <a:off x="4275015" y="2047381"/>
+            <a:ext cx="4364892" cy="506546"/>
           </a:xfrm>
           <a:prstGeom prst="rect">
             <a:avLst/>
@@ -5388,7 +5324,13 @@
       </p:pic>
       <p:pic>
         <p:nvPicPr>
-          <p:cNvPr id="9" name="Afbeelding 8"/>
+          <p:cNvPr id="10" name="Picture 11" descr="A screenshot of a cell phone&#10;&#10;Description generated with very high confidence">
+            <a:extLst>
+              <a:ext uri="{FF2B5EF4-FFF2-40B4-BE49-F238E27FC236}">
+                <a16:creationId xmlns:a16="http://schemas.microsoft.com/office/drawing/2014/main" id="{DFEF2DA2-BE35-4D49-ABB3-9BDF2C517AE0}"/>
+              </a:ext>
+            </a:extLst>
+          </p:cNvPr>
           <p:cNvPicPr>
             <a:picLocks noChangeAspect="1"/>
           </p:cNvPicPr>
@@ -5402,8 +5344,8 @@
         </p:blipFill>
         <p:spPr>
           <a:xfrm>
-            <a:off x="4139943" y="4433640"/>
-            <a:ext cx="2771916" cy="1785754"/>
+            <a:off x="4275016" y="3027190"/>
+            <a:ext cx="4364891" cy="3079851"/>
           </a:xfrm>
           <a:prstGeom prst="rect">
             <a:avLst/>
@@ -5420,13 +5362,6 @@
   <p:clrMapOvr>
     <a:masterClrMapping/>
   </p:clrMapOvr>
-  <p:timing>
-    <p:tnLst>
-      <p:par>
-        <p:cTn xmlns:p14="http://schemas.microsoft.com/office/powerpoint/2010/main" id="1" dur="indefinite" restart="never" nodeType="tmRoot"/>
-      </p:par>
-    </p:tnLst>
-  </p:timing>
 </p:sld>
 </file>
 
@@ -5469,16 +5404,12 @@
           <a:p>
             <a:pPr algn="l"/>
             <a:r>
-              <a:rPr lang="en-US" dirty="0" smtClean="0">
+              <a:rPr lang="en-US" dirty="0">
                 <a:latin typeface="Comic Sans MS"/>
                 <a:cs typeface="Comic Sans MS"/>
               </a:rPr>
               <a:t>Balloon Pop </a:t>
             </a:r>
-            <a:endParaRPr lang="en-US" dirty="0">
-              <a:latin typeface="Comic Sans MS"/>
-              <a:cs typeface="Comic Sans MS"/>
-            </a:endParaRPr>
           </a:p>
         </p:txBody>
       </p:sp>
@@ -5524,10 +5455,9 @@
           <a:p>
             <a:pPr algn="ctr"/>
             <a:r>
-              <a:rPr lang="en-US" dirty="0" smtClean="0"/>
+              <a:rPr lang="en-US" dirty="0"/>
               <a:t>Balloon Pop</a:t>
             </a:r>
-            <a:endParaRPr lang="en-US" dirty="0"/>
           </a:p>
         </p:txBody>
       </p:sp>
@@ -5539,8 +5469,8 @@
         </p:nvSpPr>
         <p:spPr>
           <a:xfrm>
-            <a:off x="408057" y="1390952"/>
-            <a:ext cx="3587446" cy="923330"/>
+            <a:off x="378749" y="1234644"/>
+            <a:ext cx="3812138" cy="1200329"/>
           </a:xfrm>
           <a:prstGeom prst="rect">
             <a:avLst/>
@@ -5548,89 +5478,95 @@
           <a:noFill/>
         </p:spPr>
         <p:txBody>
-          <a:bodyPr wrap="square" rtlCol="0">
+          <a:bodyPr wrap="square" rtlCol="0" anchor="t">
             <a:spAutoFit/>
           </a:bodyPr>
           <a:lstStyle/>
           <a:p>
-            <a:r>
-              <a:rPr lang="nl-NL" dirty="0" smtClean="0">
-                <a:latin typeface="Comic Sans MS"/>
-                <a:cs typeface="Comic Sans MS"/>
-              </a:rPr>
-              <a:t>Laat de ballonnen die gemist zijn boven verdwijnen</a:t>
-            </a:r>
             <a:endParaRPr lang="nl-NL" dirty="0">
               <a:latin typeface="Comic Sans MS"/>
               <a:cs typeface="Comic Sans MS"/>
             </a:endParaRPr>
           </a:p>
           <a:p>
-            <a:endParaRPr lang="nl-NL" dirty="0" smtClean="0">
-              <a:latin typeface="Comic Sans MS"/>
-              <a:cs typeface="Comic Sans MS"/>
-            </a:endParaRPr>
-          </a:p>
-        </p:txBody>
-      </p:sp>
-      <p:sp>
-        <p:nvSpPr>
-          <p:cNvPr id="11" name="TextBox 6"/>
-          <p:cNvSpPr txBox="1"/>
-          <p:nvPr/>
-        </p:nvSpPr>
-        <p:spPr>
-          <a:xfrm>
-            <a:off x="408057" y="4198700"/>
-            <a:ext cx="3763582" cy="1200329"/>
-          </a:xfrm>
-          <a:prstGeom prst="rect">
-            <a:avLst/>
-          </a:prstGeom>
-          <a:noFill/>
-        </p:spPr>
-        <p:txBody>
-          <a:bodyPr wrap="square" rtlCol="0">
-            <a:spAutoFit/>
-          </a:bodyPr>
-          <a:lstStyle/>
-          <a:p>
-            <a:r>
-              <a:rPr lang="nl-NL" dirty="0" smtClean="0">
-                <a:latin typeface="Comic Sans MS"/>
-                <a:cs typeface="Comic Sans MS"/>
-              </a:rPr>
-              <a:t>Voor een beetje variatie voeg het volgende code blok toe. </a:t>
-            </a:r>
-          </a:p>
-          <a:p>
-            <a:r>
-              <a:rPr lang="nl-NL" dirty="0" smtClean="0">
-                <a:latin typeface="Comic Sans MS"/>
-                <a:cs typeface="Comic Sans MS"/>
-              </a:rPr>
-              <a:t>De ballonnen zullen nu van kleur en van grootte </a:t>
-            </a:r>
             <a:r>
               <a:rPr lang="nl-NL" dirty="0">
                 <a:latin typeface="Comic Sans MS"/>
                 <a:cs typeface="Comic Sans MS"/>
               </a:rPr>
-              <a:t>v</a:t>
-            </a:r>
-            <a:r>
-              <a:rPr lang="nl-NL" dirty="0" smtClean="0">
+              <a:t>Als de rode </a:t>
+            </a:r>
+            <a:r>
+              <a:rPr lang="nl-NL" dirty="0" err="1">
                 <a:latin typeface="Comic Sans MS"/>
                 <a:cs typeface="Comic Sans MS"/>
               </a:rPr>
-              <a:t>eranderen!</a:t>
-            </a:r>
+              <a:t>sprite</a:t>
+            </a:r>
+            <a:r>
+              <a:rPr lang="nl-NL" dirty="0">
+                <a:latin typeface="Comic Sans MS"/>
+                <a:cs typeface="Comic Sans MS"/>
+              </a:rPr>
+              <a:t> de ballon raakt moet hij </a:t>
+            </a:r>
+            <a:endParaRPr lang="nl-NL" dirty="0">
+              <a:latin typeface="Comic Sans MS"/>
+              <a:cs typeface="Calibri"/>
+            </a:endParaRPr>
+          </a:p>
+          <a:p>
+            <a:r>
+              <a:rPr lang="nl-NL" dirty="0">
+                <a:latin typeface="Comic Sans MS"/>
+                <a:cs typeface="Comic Sans MS"/>
+              </a:rPr>
+              <a:t>verdwijnen met een plop geluidje.</a:t>
+            </a:r>
+            <a:endParaRPr lang="nl-NL" dirty="0">
+              <a:cs typeface="Calibri"/>
+            </a:endParaRPr>
+          </a:p>
+        </p:txBody>
+      </p:sp>
+      <p:sp>
+        <p:nvSpPr>
+          <p:cNvPr id="11" name="TextBox 6"/>
+          <p:cNvSpPr txBox="1"/>
+          <p:nvPr/>
+        </p:nvSpPr>
+        <p:spPr>
+          <a:xfrm>
+            <a:off x="352427" y="4433640"/>
+            <a:ext cx="3763582" cy="369332"/>
+          </a:xfrm>
+          <a:prstGeom prst="rect">
+            <a:avLst/>
+          </a:prstGeom>
+          <a:noFill/>
+        </p:spPr>
+        <p:txBody>
+          <a:bodyPr wrap="square" rtlCol="0" anchor="t">
+            <a:spAutoFit/>
+          </a:bodyPr>
+          <a:lstStyle/>
+          <a:p>
+            <a:endParaRPr lang="nl-NL" dirty="0">
+              <a:latin typeface="Comic Sans MS"/>
+              <a:cs typeface="Comic Sans MS"/>
+            </a:endParaRPr>
           </a:p>
         </p:txBody>
       </p:sp>
       <p:pic>
         <p:nvPicPr>
-          <p:cNvPr id="3" name="Afbeelding 2"/>
+          <p:cNvPr id="12" name="Picture 12" descr="A screenshot of a cell phone&#10;&#10;Description generated with very high confidence">
+            <a:extLst>
+              <a:ext uri="{FF2B5EF4-FFF2-40B4-BE49-F238E27FC236}">
+                <a16:creationId xmlns:a16="http://schemas.microsoft.com/office/drawing/2014/main" id="{A5E14738-3800-4825-9E59-7D251BE743F8}"/>
+              </a:ext>
+            </a:extLst>
+          </p:cNvPr>
           <p:cNvPicPr>
             <a:picLocks noChangeAspect="1"/>
           </p:cNvPicPr>
@@ -5644,8 +5580,8 @@
         </p:blipFill>
         <p:spPr>
           <a:xfrm>
-            <a:off x="4408109" y="1390952"/>
-            <a:ext cx="3180237" cy="2623053"/>
+            <a:off x="4167558" y="1615419"/>
+            <a:ext cx="3524738" cy="2005467"/>
           </a:xfrm>
           <a:prstGeom prst="rect">
             <a:avLst/>
@@ -5654,7 +5590,13 @@
       </p:pic>
       <p:pic>
         <p:nvPicPr>
-          <p:cNvPr id="6" name="Afbeelding 5"/>
+          <p:cNvPr id="15" name="Afbeelding 5">
+            <a:extLst>
+              <a:ext uri="{FF2B5EF4-FFF2-40B4-BE49-F238E27FC236}">
+                <a16:creationId xmlns:a16="http://schemas.microsoft.com/office/drawing/2014/main" id="{2F5A7C43-B914-4EC3-9897-A519A37E2E5E}"/>
+              </a:ext>
+            </a:extLst>
+          </p:cNvPr>
           <p:cNvPicPr>
             <a:picLocks noChangeAspect="1"/>
           </p:cNvPicPr>
@@ -5668,8 +5610,8 @@
         </p:blipFill>
         <p:spPr>
           <a:xfrm>
-            <a:off x="4408109" y="4198700"/>
-            <a:ext cx="4457700" cy="1358900"/>
+            <a:off x="4154109" y="4618775"/>
+            <a:ext cx="3666393" cy="1124439"/>
           </a:xfrm>
           <a:prstGeom prst="rect">
             <a:avLst/>
@@ -5678,7 +5620,13 @@
       </p:pic>
       <p:pic>
         <p:nvPicPr>
-          <p:cNvPr id="9" name="Afbeelding 8"/>
+          <p:cNvPr id="17" name="Afbeelding 8" descr="A picture containing balloon, aircraft&#10;&#10;Description generated with high confidence">
+            <a:extLst>
+              <a:ext uri="{FF2B5EF4-FFF2-40B4-BE49-F238E27FC236}">
+                <a16:creationId xmlns:a16="http://schemas.microsoft.com/office/drawing/2014/main" id="{50AF005D-9D20-45FF-979D-878700D133FF}"/>
+              </a:ext>
+            </a:extLst>
+          </p:cNvPr>
           <p:cNvPicPr>
             <a:picLocks noChangeAspect="1"/>
           </p:cNvPicPr>
@@ -5692,7 +5640,7 @@
         </p:blipFill>
         <p:spPr>
           <a:xfrm>
-            <a:off x="527236" y="2197155"/>
+            <a:off x="546774" y="2695386"/>
             <a:ext cx="3088184" cy="1738479"/>
           </a:xfrm>
           <a:prstGeom prst="rect">
@@ -5700,23 +5648,70 @@
           </a:prstGeom>
         </p:spPr>
       </p:pic>
+      <p:sp>
+        <p:nvSpPr>
+          <p:cNvPr id="22" name="TextBox 21">
+            <a:extLst>
+              <a:ext uri="{FF2B5EF4-FFF2-40B4-BE49-F238E27FC236}">
+                <a16:creationId xmlns:a16="http://schemas.microsoft.com/office/drawing/2014/main" id="{F762AF35-E8EF-4F66-BB70-FB3D0F4AE09B}"/>
+              </a:ext>
+            </a:extLst>
+          </p:cNvPr>
+          <p:cNvSpPr txBox="1"/>
+          <p:nvPr/>
+        </p:nvSpPr>
+        <p:spPr>
+          <a:xfrm>
+            <a:off x="435708" y="4577862"/>
+            <a:ext cx="3534507" cy="1477328"/>
+          </a:xfrm>
+          <a:prstGeom prst="rect">
+            <a:avLst/>
+          </a:prstGeom>
+        </p:spPr>
+        <p:txBody>
+          <a:bodyPr rot="0" spcFirstLastPara="0" vertOverflow="overflow" horzOverflow="overflow" vert="horz" wrap="square" lIns="91440" tIns="45720" rIns="91440" bIns="45720" numCol="1" spcCol="0" rtlCol="0" fromWordArt="0" anchor="t" anchorCtr="0" forceAA="0" compatLnSpc="1">
+            <a:prstTxWarp prst="textNoShape">
+              <a:avLst/>
+            </a:prstTxWarp>
+            <a:spAutoFit/>
+          </a:bodyPr>
+          <a:lstStyle/>
+          <a:p>
+            <a:r>
+              <a:rPr lang="nl-NL" dirty="0">
+                <a:latin typeface="Comic Sans MS"/>
+              </a:rPr>
+              <a:t>Voor een beetje variatie, voeg het volgende code blok toe bij aan het maken van een kloon. </a:t>
+            </a:r>
+            <a:endParaRPr lang="en-US" dirty="0">
+              <a:latin typeface="Comic Sans MS"/>
+              <a:cs typeface="Calibri"/>
+            </a:endParaRPr>
+          </a:p>
+          <a:p>
+            <a:r>
+              <a:rPr lang="nl-NL" dirty="0">
+                <a:latin typeface="Comic Sans MS"/>
+              </a:rPr>
+              <a:t>De ballonnen zullen nu van kleur en van grootte veranderen!</a:t>
+            </a:r>
+            <a:endParaRPr lang="en-US" dirty="0">
+              <a:latin typeface="Comic Sans MS"/>
+            </a:endParaRPr>
+          </a:p>
+        </p:txBody>
+      </p:sp>
     </p:spTree>
     <p:extLst>
       <p:ext uri="{BB962C8B-B14F-4D97-AF65-F5344CB8AC3E}">
-        <p14:creationId xmlns:p14="http://schemas.microsoft.com/office/powerpoint/2010/main" val="1281457354"/>
+        <p14:creationId xmlns:p14="http://schemas.microsoft.com/office/powerpoint/2010/main" val="3988667586"/>
       </p:ext>
     </p:extLst>
   </p:cSld>
   <p:clrMapOvr>
     <a:masterClrMapping/>
   </p:clrMapOvr>
-  <p:timing>
-    <p:tnLst>
-      <p:par>
-        <p:cTn xmlns:p14="http://schemas.microsoft.com/office/powerpoint/2010/main" id="1" dur="indefinite" restart="never" nodeType="tmRoot"/>
-      </p:par>
-    </p:tnLst>
-  </p:timing>
 </p:sld>
 </file>
 
@@ -5759,16 +5754,12 @@
           <a:p>
             <a:pPr algn="l"/>
             <a:r>
-              <a:rPr lang="en-US" dirty="0" smtClean="0">
+              <a:rPr lang="en-US" dirty="0">
                 <a:latin typeface="Comic Sans MS"/>
                 <a:cs typeface="Comic Sans MS"/>
               </a:rPr>
               <a:t>Balloon Pop </a:t>
             </a:r>
-            <a:endParaRPr lang="en-US" dirty="0">
-              <a:latin typeface="Comic Sans MS"/>
-              <a:cs typeface="Comic Sans MS"/>
-            </a:endParaRPr>
           </a:p>
         </p:txBody>
       </p:sp>
@@ -5814,10 +5805,9 @@
           <a:p>
             <a:pPr algn="ctr"/>
             <a:r>
-              <a:rPr lang="en-US" dirty="0" smtClean="0"/>
+              <a:rPr lang="en-US" dirty="0"/>
               <a:t>Balloon Pop</a:t>
             </a:r>
-            <a:endParaRPr lang="en-US" dirty="0"/>
           </a:p>
         </p:txBody>
       </p:sp>
@@ -5829,8 +5819,8 @@
         </p:nvSpPr>
         <p:spPr>
           <a:xfrm>
-            <a:off x="408057" y="1390952"/>
-            <a:ext cx="3763582" cy="2308324"/>
+            <a:off x="466672" y="1527721"/>
+            <a:ext cx="3587446" cy="3416320"/>
           </a:xfrm>
           <a:prstGeom prst="rect">
             <a:avLst/>
@@ -5838,17 +5828,17 @@
           <a:noFill/>
         </p:spPr>
         <p:txBody>
-          <a:bodyPr wrap="square" rtlCol="0">
+          <a:bodyPr wrap="square" rtlCol="0" anchor="t">
             <a:spAutoFit/>
           </a:bodyPr>
           <a:lstStyle/>
           <a:p>
             <a:r>
-              <a:rPr lang="nl-NL" dirty="0" smtClean="0">
+              <a:rPr lang="nl-NL" dirty="0">
                 <a:latin typeface="Comic Sans MS"/>
                 <a:cs typeface="Comic Sans MS"/>
               </a:rPr>
-              <a:t>Punten tellen!</a:t>
+              <a:t>Laat de ballonnen die gemist zijn boven verdwijnen</a:t>
             </a:r>
           </a:p>
           <a:p>
@@ -5858,34 +5848,97 @@
             </a:endParaRPr>
           </a:p>
           <a:p>
-            <a:r>
-              <a:rPr lang="nl-NL" dirty="0" smtClean="0">
-                <a:latin typeface="Comic Sans MS"/>
-                <a:cs typeface="Comic Sans MS"/>
-              </a:rPr>
-              <a:t>Maak een data element aan met de naam Score. </a:t>
-            </a:r>
-          </a:p>
-          <a:p>
             <a:endParaRPr lang="nl-NL" dirty="0">
               <a:latin typeface="Comic Sans MS"/>
               <a:cs typeface="Comic Sans MS"/>
             </a:endParaRPr>
           </a:p>
           <a:p>
-            <a:r>
-              <a:rPr lang="nl-NL" dirty="0" smtClean="0">
+            <a:endParaRPr lang="nl-NL" dirty="0">
+              <a:latin typeface="Comic Sans MS"/>
+            </a:endParaRPr>
+          </a:p>
+          <a:p>
+            <a:endParaRPr lang="nl-NL" dirty="0">
+              <a:latin typeface="Comic Sans MS"/>
+            </a:endParaRPr>
+          </a:p>
+          <a:p>
+            <a:endParaRPr lang="nl-NL" dirty="0">
+              <a:latin typeface="Comic Sans MS"/>
+            </a:endParaRPr>
+          </a:p>
+          <a:p>
+            <a:r>
+              <a:rPr lang="nl-NL" dirty="0">
                 <a:latin typeface="Comic Sans MS"/>
-                <a:cs typeface="Comic Sans MS"/>
               </a:rPr>
-              <a:t>Deze zal ook in je scherm verschijnen, met het codeblokje zet je de score op 0.</a:t>
-            </a:r>
+              <a:t>Het spel is bijna klaar !</a:t>
+            </a:r>
+            <a:endParaRPr lang="en-US" dirty="0">
+              <a:latin typeface="Comic Sans MS"/>
+            </a:endParaRPr>
+          </a:p>
+          <a:p>
+            <a:endParaRPr lang="nl-NL" dirty="0">
+              <a:latin typeface="Comic Sans MS"/>
+            </a:endParaRPr>
+          </a:p>
+          <a:p>
+            <a:r>
+              <a:rPr lang="nl-NL" dirty="0">
+                <a:latin typeface="Comic Sans MS"/>
+              </a:rPr>
+              <a:t>Nu de punten telling implementeren.</a:t>
+            </a:r>
+            <a:endParaRPr lang="nl-NL" dirty="0"/>
+          </a:p>
+          <a:p>
+            <a:endParaRPr lang="nl-NL" dirty="0">
+              <a:latin typeface="Comic Sans MS"/>
+              <a:cs typeface="Comic Sans MS"/>
+            </a:endParaRPr>
+          </a:p>
+        </p:txBody>
+      </p:sp>
+      <p:sp>
+        <p:nvSpPr>
+          <p:cNvPr id="11" name="TextBox 6"/>
+          <p:cNvSpPr txBox="1"/>
+          <p:nvPr/>
+        </p:nvSpPr>
+        <p:spPr>
+          <a:xfrm>
+            <a:off x="408057" y="4198700"/>
+            <a:ext cx="3763582" cy="369332"/>
+          </a:xfrm>
+          <a:prstGeom prst="rect">
+            <a:avLst/>
+          </a:prstGeom>
+          <a:noFill/>
+        </p:spPr>
+        <p:txBody>
+          <a:bodyPr wrap="square" rtlCol="0" anchor="t">
+            <a:spAutoFit/>
+          </a:bodyPr>
+          <a:lstStyle/>
+          <a:p>
+            <a:endParaRPr lang="nl-NL" dirty="0">
+              <a:latin typeface="Comic Sans MS"/>
+              <a:cs typeface="Comic Sans MS"/>
+            </a:endParaRPr>
           </a:p>
         </p:txBody>
       </p:sp>
       <p:pic>
         <p:nvPicPr>
-          <p:cNvPr id="8" name="Afbeelding 7"/>
+          <p:cNvPr id="3" name="Picture 5" descr="A screenshot of a cell phone&#10;&#10;Description generated with high confidence">
+            <a:extLst>
+              <a:ext uri="{FF2B5EF4-FFF2-40B4-BE49-F238E27FC236}">
+                <a16:creationId xmlns:a16="http://schemas.microsoft.com/office/drawing/2014/main" id="{E0C19D1E-6854-47B3-A304-0CD117033B33}"/>
+              </a:ext>
+            </a:extLst>
+          </p:cNvPr>
           <p:cNvPicPr>
             <a:picLocks noChangeAspect="1"/>
           </p:cNvPicPr>
@@ -5899,230 +5952,24 @@
         </p:blipFill>
         <p:spPr>
           <a:xfrm>
-            <a:off x="4386098" y="1277266"/>
-            <a:ext cx="4334204" cy="3371048"/>
+            <a:off x="3913555" y="1592998"/>
+            <a:ext cx="3710353" cy="3281234"/>
           </a:xfrm>
           <a:prstGeom prst="rect">
             <a:avLst/>
           </a:prstGeom>
         </p:spPr>
       </p:pic>
-      <p:pic>
-        <p:nvPicPr>
-          <p:cNvPr id="12" name="Afbeelding 11"/>
-          <p:cNvPicPr>
-            <a:picLocks noChangeAspect="1"/>
-          </p:cNvPicPr>
-          <p:nvPr/>
-        </p:nvPicPr>
-        <p:blipFill>
-          <a:blip r:embed="rId3"/>
-          <a:stretch>
-            <a:fillRect/>
-          </a:stretch>
-        </p:blipFill>
-        <p:spPr>
-          <a:xfrm>
-            <a:off x="662440" y="3724719"/>
-            <a:ext cx="508764" cy="640242"/>
-          </a:xfrm>
-          <a:prstGeom prst="rect">
-            <a:avLst/>
-          </a:prstGeom>
-        </p:spPr>
-      </p:pic>
-      <p:pic>
-        <p:nvPicPr>
-          <p:cNvPr id="13" name="Afbeelding 12"/>
-          <p:cNvPicPr>
-            <a:picLocks noChangeAspect="1"/>
-          </p:cNvPicPr>
-          <p:nvPr/>
-        </p:nvPicPr>
-        <p:blipFill>
-          <a:blip r:embed="rId4"/>
-          <a:stretch>
-            <a:fillRect/>
-          </a:stretch>
-        </p:blipFill>
-        <p:spPr>
-          <a:xfrm>
-            <a:off x="2258240" y="3724719"/>
-            <a:ext cx="564390" cy="696481"/>
-          </a:xfrm>
-          <a:prstGeom prst="rect">
-            <a:avLst/>
-          </a:prstGeom>
-        </p:spPr>
-      </p:pic>
-      <p:pic>
-        <p:nvPicPr>
-          <p:cNvPr id="14" name="Afbeelding 13"/>
-          <p:cNvPicPr>
-            <a:picLocks noChangeAspect="1"/>
-          </p:cNvPicPr>
-          <p:nvPr/>
-        </p:nvPicPr>
-        <p:blipFill>
-          <a:blip r:embed="rId5"/>
-          <a:stretch>
-            <a:fillRect/>
-          </a:stretch>
-        </p:blipFill>
-        <p:spPr>
-          <a:xfrm>
-            <a:off x="1652727" y="3699561"/>
-            <a:ext cx="605513" cy="715082"/>
-          </a:xfrm>
-          <a:prstGeom prst="rect">
-            <a:avLst/>
-          </a:prstGeom>
-        </p:spPr>
-      </p:pic>
-      <p:sp>
-        <p:nvSpPr>
-          <p:cNvPr id="15" name="Tekstvak 14"/>
-          <p:cNvSpPr txBox="1"/>
-          <p:nvPr/>
-        </p:nvSpPr>
-        <p:spPr>
-          <a:xfrm>
-            <a:off x="520338" y="4407795"/>
-            <a:ext cx="792968" cy="369332"/>
-          </a:xfrm>
-          <a:prstGeom prst="rect">
-            <a:avLst/>
-          </a:prstGeom>
-          <a:noFill/>
-        </p:spPr>
-        <p:txBody>
-          <a:bodyPr wrap="none" rtlCol="0">
-            <a:spAutoFit/>
-          </a:bodyPr>
-          <a:lstStyle/>
-          <a:p>
-            <a:r>
-              <a:rPr lang="nl-NL" dirty="0" smtClean="0"/>
-              <a:t>1 Punt</a:t>
-            </a:r>
-            <a:endParaRPr lang="nl-NL" dirty="0"/>
-          </a:p>
-        </p:txBody>
-      </p:sp>
-      <p:sp>
-        <p:nvSpPr>
-          <p:cNvPr id="17" name="Tekstvak 16"/>
-          <p:cNvSpPr txBox="1"/>
-          <p:nvPr/>
-        </p:nvSpPr>
-        <p:spPr>
-          <a:xfrm>
-            <a:off x="1708356" y="4397096"/>
-            <a:ext cx="1099768" cy="369332"/>
-          </a:xfrm>
-          <a:prstGeom prst="rect">
-            <a:avLst/>
-          </a:prstGeom>
-          <a:noFill/>
-        </p:spPr>
-        <p:txBody>
-          <a:bodyPr wrap="none" rtlCol="0">
-            <a:spAutoFit/>
-          </a:bodyPr>
-          <a:lstStyle/>
-          <a:p>
-            <a:r>
-              <a:rPr lang="nl-NL" dirty="0" smtClean="0"/>
-              <a:t>-2 Punten</a:t>
-            </a:r>
-            <a:endParaRPr lang="nl-NL" dirty="0"/>
-          </a:p>
-        </p:txBody>
-      </p:sp>
-      <p:pic>
-        <p:nvPicPr>
-          <p:cNvPr id="18" name="Afbeelding 17"/>
-          <p:cNvPicPr>
-            <a:picLocks noChangeAspect="1"/>
-          </p:cNvPicPr>
-          <p:nvPr/>
-        </p:nvPicPr>
-        <p:blipFill>
-          <a:blip r:embed="rId6"/>
-          <a:stretch>
-            <a:fillRect/>
-          </a:stretch>
-        </p:blipFill>
-        <p:spPr>
-          <a:xfrm>
-            <a:off x="545170" y="4766428"/>
-            <a:ext cx="2438400" cy="1498600"/>
-          </a:xfrm>
-          <a:prstGeom prst="rect">
-            <a:avLst/>
-          </a:prstGeom>
-        </p:spPr>
-      </p:pic>
-      <p:sp>
-        <p:nvSpPr>
-          <p:cNvPr id="19" name="Tekstvak 18"/>
-          <p:cNvSpPr txBox="1"/>
-          <p:nvPr/>
-        </p:nvSpPr>
-        <p:spPr>
-          <a:xfrm>
-            <a:off x="4426356" y="4980911"/>
-            <a:ext cx="3672174" cy="923330"/>
-          </a:xfrm>
-          <a:prstGeom prst="rect">
-            <a:avLst/>
-          </a:prstGeom>
-          <a:noFill/>
-        </p:spPr>
-        <p:txBody>
-          <a:bodyPr wrap="none" rtlCol="0">
-            <a:spAutoFit/>
-          </a:bodyPr>
-          <a:lstStyle/>
-          <a:p>
-            <a:r>
-              <a:rPr lang="nl-NL" dirty="0" smtClean="0"/>
-              <a:t>Het spel is bijna klaar !</a:t>
-            </a:r>
-          </a:p>
-          <a:p>
-            <a:endParaRPr lang="nl-NL" dirty="0"/>
-          </a:p>
-          <a:p>
-            <a:r>
-              <a:rPr lang="nl-NL" dirty="0" smtClean="0"/>
-              <a:t>Nu de punten </a:t>
-            </a:r>
-            <a:r>
-              <a:rPr lang="nl-NL" smtClean="0"/>
-              <a:t>telling implementeren.</a:t>
-            </a:r>
-            <a:endParaRPr lang="nl-NL" dirty="0"/>
-          </a:p>
-        </p:txBody>
-      </p:sp>
     </p:spTree>
     <p:extLst>
       <p:ext uri="{BB962C8B-B14F-4D97-AF65-F5344CB8AC3E}">
-        <p14:creationId xmlns:p14="http://schemas.microsoft.com/office/powerpoint/2010/main" val="3040934672"/>
+        <p14:creationId xmlns:p14="http://schemas.microsoft.com/office/powerpoint/2010/main" val="1281457354"/>
       </p:ext>
     </p:extLst>
   </p:cSld>
   <p:clrMapOvr>
     <a:masterClrMapping/>
   </p:clrMapOvr>
-  <p:timing>
-    <p:tnLst>
-      <p:par>
-        <p:cTn xmlns:p14="http://schemas.microsoft.com/office/powerpoint/2010/main" id="1" dur="indefinite" restart="never" nodeType="tmRoot"/>
-      </p:par>
-    </p:tnLst>
-  </p:timing>
 </p:sld>
 </file>
 
@@ -6165,16 +6012,12 @@
           <a:p>
             <a:pPr algn="l"/>
             <a:r>
-              <a:rPr lang="en-US" dirty="0" smtClean="0">
+              <a:rPr lang="en-US" dirty="0">
                 <a:latin typeface="Comic Sans MS"/>
                 <a:cs typeface="Comic Sans MS"/>
               </a:rPr>
               <a:t>Balloon Pop </a:t>
             </a:r>
-            <a:endParaRPr lang="en-US" dirty="0">
-              <a:latin typeface="Comic Sans MS"/>
-              <a:cs typeface="Comic Sans MS"/>
-            </a:endParaRPr>
           </a:p>
         </p:txBody>
       </p:sp>
@@ -6220,10 +6063,451 @@
           <a:p>
             <a:pPr algn="ctr"/>
             <a:r>
-              <a:rPr lang="en-US" dirty="0" smtClean="0"/>
+              <a:rPr lang="en-US" dirty="0"/>
               <a:t>Balloon Pop</a:t>
             </a:r>
+          </a:p>
+        </p:txBody>
+      </p:sp>
+      <p:sp>
+        <p:nvSpPr>
+          <p:cNvPr id="7" name="TextBox 6"/>
+          <p:cNvSpPr txBox="1"/>
+          <p:nvPr/>
+        </p:nvSpPr>
+        <p:spPr>
+          <a:xfrm>
+            <a:off x="408057" y="1390952"/>
+            <a:ext cx="3763582" cy="1754326"/>
+          </a:xfrm>
+          <a:prstGeom prst="rect">
+            <a:avLst/>
+          </a:prstGeom>
+          <a:noFill/>
+        </p:spPr>
+        <p:txBody>
+          <a:bodyPr wrap="square" rtlCol="0" anchor="t">
+            <a:spAutoFit/>
+          </a:bodyPr>
+          <a:lstStyle/>
+          <a:p>
+            <a:r>
+              <a:rPr lang="nl-NL" dirty="0">
+                <a:latin typeface="Comic Sans MS"/>
+                <a:cs typeface="Comic Sans MS"/>
+              </a:rPr>
+              <a:t>Maak een variabele aan met de naam Score. </a:t>
+            </a:r>
+          </a:p>
+          <a:p>
+            <a:endParaRPr lang="nl-NL" dirty="0">
+              <a:latin typeface="Comic Sans MS"/>
+              <a:cs typeface="Comic Sans MS"/>
+            </a:endParaRPr>
+          </a:p>
+          <a:p>
+            <a:r>
+              <a:rPr lang="nl-NL" dirty="0">
+                <a:latin typeface="Comic Sans MS"/>
+                <a:cs typeface="Comic Sans MS"/>
+              </a:rPr>
+              <a:t>Deze zal ook in je scherm verschijnen, met het codeblokje zet je de score op 0.</a:t>
+            </a:r>
+          </a:p>
+        </p:txBody>
+      </p:sp>
+      <p:pic>
+        <p:nvPicPr>
+          <p:cNvPr id="12" name="Afbeelding 11"/>
+          <p:cNvPicPr>
+            <a:picLocks noChangeAspect="1"/>
+          </p:cNvPicPr>
+          <p:nvPr/>
+        </p:nvPicPr>
+        <p:blipFill>
+          <a:blip r:embed="rId2"/>
+          <a:stretch>
+            <a:fillRect/>
+          </a:stretch>
+        </p:blipFill>
+        <p:spPr>
+          <a:xfrm>
+            <a:off x="662440" y="3724719"/>
+            <a:ext cx="508764" cy="640242"/>
+          </a:xfrm>
+          <a:prstGeom prst="rect">
+            <a:avLst/>
+          </a:prstGeom>
+        </p:spPr>
+      </p:pic>
+      <p:pic>
+        <p:nvPicPr>
+          <p:cNvPr id="13" name="Afbeelding 12"/>
+          <p:cNvPicPr>
+            <a:picLocks noChangeAspect="1"/>
+          </p:cNvPicPr>
+          <p:nvPr/>
+        </p:nvPicPr>
+        <p:blipFill>
+          <a:blip r:embed="rId3"/>
+          <a:stretch>
+            <a:fillRect/>
+          </a:stretch>
+        </p:blipFill>
+        <p:spPr>
+          <a:xfrm>
+            <a:off x="2258240" y="3724719"/>
+            <a:ext cx="564390" cy="696481"/>
+          </a:xfrm>
+          <a:prstGeom prst="rect">
+            <a:avLst/>
+          </a:prstGeom>
+        </p:spPr>
+      </p:pic>
+      <p:pic>
+        <p:nvPicPr>
+          <p:cNvPr id="14" name="Afbeelding 13"/>
+          <p:cNvPicPr>
+            <a:picLocks noChangeAspect="1"/>
+          </p:cNvPicPr>
+          <p:nvPr/>
+        </p:nvPicPr>
+        <p:blipFill>
+          <a:blip r:embed="rId4"/>
+          <a:stretch>
+            <a:fillRect/>
+          </a:stretch>
+        </p:blipFill>
+        <p:spPr>
+          <a:xfrm>
+            <a:off x="1652727" y="3699561"/>
+            <a:ext cx="605513" cy="715082"/>
+          </a:xfrm>
+          <a:prstGeom prst="rect">
+            <a:avLst/>
+          </a:prstGeom>
+        </p:spPr>
+      </p:pic>
+      <p:sp>
+        <p:nvSpPr>
+          <p:cNvPr id="15" name="Tekstvak 14"/>
+          <p:cNvSpPr txBox="1"/>
+          <p:nvPr/>
+        </p:nvSpPr>
+        <p:spPr>
+          <a:xfrm>
+            <a:off x="520338" y="4407795"/>
+            <a:ext cx="792968" cy="369332"/>
+          </a:xfrm>
+          <a:prstGeom prst="rect">
+            <a:avLst/>
+          </a:prstGeom>
+          <a:noFill/>
+        </p:spPr>
+        <p:txBody>
+          <a:bodyPr wrap="none" rtlCol="0">
+            <a:spAutoFit/>
+          </a:bodyPr>
+          <a:lstStyle/>
+          <a:p>
+            <a:r>
+              <a:rPr lang="nl-NL" dirty="0"/>
+              <a:t>1 Punt</a:t>
+            </a:r>
+          </a:p>
+        </p:txBody>
+      </p:sp>
+      <p:sp>
+        <p:nvSpPr>
+          <p:cNvPr id="17" name="Tekstvak 16"/>
+          <p:cNvSpPr txBox="1"/>
+          <p:nvPr/>
+        </p:nvSpPr>
+        <p:spPr>
+          <a:xfrm>
+            <a:off x="1708356" y="4397096"/>
+            <a:ext cx="1099768" cy="369332"/>
+          </a:xfrm>
+          <a:prstGeom prst="rect">
+            <a:avLst/>
+          </a:prstGeom>
+          <a:noFill/>
+        </p:spPr>
+        <p:txBody>
+          <a:bodyPr wrap="none" rtlCol="0">
+            <a:spAutoFit/>
+          </a:bodyPr>
+          <a:lstStyle/>
+          <a:p>
+            <a:r>
+              <a:rPr lang="nl-NL" dirty="0"/>
+              <a:t>-2 Punten</a:t>
+            </a:r>
+          </a:p>
+        </p:txBody>
+      </p:sp>
+      <p:pic>
+        <p:nvPicPr>
+          <p:cNvPr id="18" name="Afbeelding 17"/>
+          <p:cNvPicPr>
+            <a:picLocks noChangeAspect="1"/>
+          </p:cNvPicPr>
+          <p:nvPr/>
+        </p:nvPicPr>
+        <p:blipFill>
+          <a:blip r:embed="rId5"/>
+          <a:stretch>
+            <a:fillRect/>
+          </a:stretch>
+        </p:blipFill>
+        <p:spPr>
+          <a:xfrm>
+            <a:off x="545170" y="4766428"/>
+            <a:ext cx="2438400" cy="1498600"/>
+          </a:xfrm>
+          <a:prstGeom prst="rect">
+            <a:avLst/>
+          </a:prstGeom>
+        </p:spPr>
+      </p:pic>
+      <p:pic>
+        <p:nvPicPr>
+          <p:cNvPr id="3" name="Picture 5" descr="A screenshot of a cell phone&#10;&#10;Description generated with very high confidence">
+            <a:extLst>
+              <a:ext uri="{FF2B5EF4-FFF2-40B4-BE49-F238E27FC236}">
+                <a16:creationId xmlns:a16="http://schemas.microsoft.com/office/drawing/2014/main" id="{945337FB-FEB4-47B2-BA22-84F95A0BA845}"/>
+              </a:ext>
+            </a:extLst>
+          </p:cNvPr>
+          <p:cNvPicPr>
+            <a:picLocks noChangeAspect="1"/>
+          </p:cNvPicPr>
+          <p:nvPr/>
+        </p:nvPicPr>
+        <p:blipFill>
+          <a:blip r:embed="rId6"/>
+          <a:stretch>
+            <a:fillRect/>
+          </a:stretch>
+        </p:blipFill>
+        <p:spPr>
+          <a:xfrm>
+            <a:off x="4227977" y="1293446"/>
+            <a:ext cx="1743122" cy="3020647"/>
+          </a:xfrm>
+          <a:prstGeom prst="rect">
+            <a:avLst/>
+          </a:prstGeom>
+        </p:spPr>
+      </p:pic>
+      <p:pic>
+        <p:nvPicPr>
+          <p:cNvPr id="9" name="Picture 9" descr="A close up of a sign&#10;&#10;Description generated with high confidence">
+            <a:extLst>
+              <a:ext uri="{FF2B5EF4-FFF2-40B4-BE49-F238E27FC236}">
+                <a16:creationId xmlns:a16="http://schemas.microsoft.com/office/drawing/2014/main" id="{3D482338-DBE6-48AD-B872-5F960C245793}"/>
+              </a:ext>
+            </a:extLst>
+          </p:cNvPr>
+          <p:cNvPicPr>
+            <a:picLocks noChangeAspect="1"/>
+          </p:cNvPicPr>
+          <p:nvPr/>
+        </p:nvPicPr>
+        <p:blipFill>
+          <a:blip r:embed="rId7"/>
+          <a:stretch>
+            <a:fillRect/>
+          </a:stretch>
+        </p:blipFill>
+        <p:spPr>
+          <a:xfrm>
+            <a:off x="6140939" y="2369574"/>
+            <a:ext cx="2743200" cy="1024697"/>
+          </a:xfrm>
+          <a:prstGeom prst="rect">
+            <a:avLst/>
+          </a:prstGeom>
+        </p:spPr>
+      </p:pic>
+      <p:sp>
+        <p:nvSpPr>
+          <p:cNvPr id="11" name="TextBox 10">
+            <a:extLst>
+              <a:ext uri="{FF2B5EF4-FFF2-40B4-BE49-F238E27FC236}">
+                <a16:creationId xmlns:a16="http://schemas.microsoft.com/office/drawing/2014/main" id="{47E9F277-245E-4F0E-8D67-8A7D7E22169A}"/>
+              </a:ext>
+            </a:extLst>
+          </p:cNvPr>
+          <p:cNvSpPr txBox="1"/>
+          <p:nvPr/>
+        </p:nvSpPr>
+        <p:spPr>
+          <a:xfrm>
+            <a:off x="3800231" y="4656015"/>
+            <a:ext cx="4572000" cy="1477328"/>
+          </a:xfrm>
+          <a:prstGeom prst="rect">
+            <a:avLst/>
+          </a:prstGeom>
+        </p:spPr>
+        <p:txBody>
+          <a:bodyPr rot="0" spcFirstLastPara="0" vertOverflow="overflow" horzOverflow="overflow" vert="horz" wrap="square" lIns="91440" tIns="45720" rIns="91440" bIns="45720" numCol="1" spcCol="0" rtlCol="0" fromWordArt="0" anchor="t" anchorCtr="0" forceAA="0" compatLnSpc="1">
+            <a:prstTxWarp prst="textNoShape">
+              <a:avLst/>
+            </a:prstTxWarp>
+            <a:spAutoFit/>
+          </a:bodyPr>
+          <a:lstStyle/>
+          <a:p>
+            <a:r>
+              <a:rPr lang="nl-NL" dirty="0">
+                <a:latin typeface="Comic Sans MS"/>
+                <a:cs typeface="Segoe UI"/>
+              </a:rPr>
+              <a:t>Nu nog punten tellen</a:t>
+            </a:r>
+            <a:r>
+              <a:rPr lang="nl-NL" dirty="0">
+                <a:latin typeface="Comic Sans MS"/>
+              </a:rPr>
+              <a:t>!</a:t>
+            </a:r>
             <a:endParaRPr lang="en-US" dirty="0"/>
+          </a:p>
+          <a:p>
+            <a:endParaRPr lang="nl-NL" dirty="0">
+              <a:latin typeface="Comic Sans MS"/>
+              <a:cs typeface="Segoe UI"/>
+            </a:endParaRPr>
+          </a:p>
+          <a:p>
+            <a:r>
+              <a:rPr lang="nl-NL" dirty="0">
+                <a:latin typeface="Comic Sans MS"/>
+                <a:cs typeface="Segoe UI"/>
+              </a:rPr>
+              <a:t>Een blauwe ballon raken levert 1 punt op, een andere kleur 2 strafpunten.</a:t>
+            </a:r>
+            <a:endParaRPr lang="en-US" dirty="0">
+              <a:latin typeface="Comic Sans MS"/>
+              <a:cs typeface="Segoe UI"/>
+            </a:endParaRPr>
+          </a:p>
+          <a:p>
+            <a:endParaRPr lang="en-US" dirty="0">
+              <a:latin typeface="Segoe UI"/>
+              <a:cs typeface="Segoe UI"/>
+            </a:endParaRPr>
+          </a:p>
+        </p:txBody>
+      </p:sp>
+    </p:spTree>
+    <p:extLst>
+      <p:ext uri="{BB962C8B-B14F-4D97-AF65-F5344CB8AC3E}">
+        <p14:creationId xmlns:p14="http://schemas.microsoft.com/office/powerpoint/2010/main" val="3040934672"/>
+      </p:ext>
+    </p:extLst>
+  </p:cSld>
+  <p:clrMapOvr>
+    <a:masterClrMapping/>
+  </p:clrMapOvr>
+</p:sld>
+</file>
+
+<file path=ppt/slides/slide9.xml><?xml version="1.0" encoding="utf-8"?>
+<p:sld xmlns:a="http://schemas.openxmlformats.org/drawingml/2006/main" xmlns:r="http://schemas.openxmlformats.org/officeDocument/2006/relationships" xmlns:p="http://schemas.openxmlformats.org/presentationml/2006/main">
+  <p:cSld>
+    <p:spTree>
+      <p:nvGrpSpPr>
+        <p:cNvPr id="1" name=""/>
+        <p:cNvGrpSpPr/>
+        <p:nvPr/>
+      </p:nvGrpSpPr>
+      <p:grpSpPr>
+        <a:xfrm>
+          <a:off x="0" y="0"/>
+          <a:ext cx="0" cy="0"/>
+          <a:chOff x="0" y="0"/>
+          <a:chExt cx="0" cy="0"/>
+        </a:xfrm>
+      </p:grpSpPr>
+      <p:sp>
+        <p:nvSpPr>
+          <p:cNvPr id="2" name="Title 1"/>
+          <p:cNvSpPr>
+            <a:spLocks noGrp="1"/>
+          </p:cNvSpPr>
+          <p:nvPr>
+            <p:ph type="title"/>
+          </p:nvPr>
+        </p:nvSpPr>
+        <p:spPr>
+          <a:xfrm>
+            <a:off x="2983570" y="504447"/>
+            <a:ext cx="5882239" cy="886505"/>
+          </a:xfrm>
+        </p:spPr>
+        <p:txBody>
+          <a:bodyPr/>
+          <a:lstStyle/>
+          <a:p>
+            <a:pPr algn="l"/>
+            <a:r>
+              <a:rPr lang="en-US" dirty="0">
+                <a:latin typeface="Comic Sans MS"/>
+                <a:cs typeface="Comic Sans MS"/>
+              </a:rPr>
+              <a:t>Balloon Pop </a:t>
+            </a:r>
+          </a:p>
+        </p:txBody>
+      </p:sp>
+      <p:sp>
+        <p:nvSpPr>
+          <p:cNvPr id="4" name="Slide Number Placeholder 3"/>
+          <p:cNvSpPr>
+            <a:spLocks noGrp="1"/>
+          </p:cNvSpPr>
+          <p:nvPr>
+            <p:ph type="sldNum" sz="quarter" idx="12"/>
+          </p:nvPr>
+        </p:nvSpPr>
+        <p:spPr/>
+        <p:txBody>
+          <a:bodyPr/>
+          <a:lstStyle/>
+          <a:p>
+            <a:pPr algn="r"/>
+            <a:fld id="{6C0001A9-357E-7541-840E-1F18FD9D64CA}" type="slidenum">
+              <a:rPr lang="en-US" smtClean="0"/>
+              <a:pPr algn="r"/>
+              <a:t>9</a:t>
+            </a:fld>
+            <a:endParaRPr lang="en-US" dirty="0"/>
+          </a:p>
+        </p:txBody>
+      </p:sp>
+      <p:sp>
+        <p:nvSpPr>
+          <p:cNvPr id="5" name="Footer Placeholder 4"/>
+          <p:cNvSpPr>
+            <a:spLocks noGrp="1"/>
+          </p:cNvSpPr>
+          <p:nvPr>
+            <p:ph type="ftr" sz="quarter" idx="11"/>
+          </p:nvPr>
+        </p:nvSpPr>
+        <p:spPr/>
+        <p:txBody>
+          <a:bodyPr/>
+          <a:lstStyle/>
+          <a:p>
+            <a:pPr algn="ctr"/>
+            <a:r>
+              <a:rPr lang="en-US" dirty="0"/>
+              <a:t>Balloon Pop</a:t>
+            </a:r>
           </a:p>
         </p:txBody>
       </p:sp>
@@ -6243,7 +6527,7 @@
         </p:blipFill>
         <p:spPr>
           <a:xfrm>
-            <a:off x="408056" y="1533730"/>
+            <a:off x="4042210" y="1895192"/>
             <a:ext cx="1016000" cy="1790700"/>
           </a:xfrm>
           <a:prstGeom prst="rect">
@@ -6259,8 +6543,8 @@
         </p:nvSpPr>
         <p:spPr>
           <a:xfrm>
-            <a:off x="1577370" y="1546476"/>
-            <a:ext cx="4696430" cy="369332"/>
+            <a:off x="111986" y="1409707"/>
+            <a:ext cx="4696430" cy="646331"/>
           </a:xfrm>
           <a:prstGeom prst="rect">
             <a:avLst/>
@@ -6268,17 +6552,17 @@
           <a:noFill/>
         </p:spPr>
         <p:txBody>
-          <a:bodyPr wrap="square" rtlCol="0">
+          <a:bodyPr wrap="square" rtlCol="0" anchor="t">
             <a:spAutoFit/>
           </a:bodyPr>
           <a:lstStyle/>
           <a:p>
             <a:r>
-              <a:rPr lang="nl-NL" dirty="0" smtClean="0">
+              <a:rPr lang="nl-NL" dirty="0">
                 <a:latin typeface="Comic Sans MS"/>
                 <a:cs typeface="Comic Sans MS"/>
               </a:rPr>
-              <a:t>Nu nog een mooie achtergrond instellen.</a:t>
+              <a:t>Je kunt nog een mooie achtergrond instellen.</a:t>
             </a:r>
           </a:p>
         </p:txBody>
@@ -6315,8 +6599,8 @@
         </p:nvSpPr>
         <p:spPr>
           <a:xfrm>
-            <a:off x="1577370" y="2245014"/>
-            <a:ext cx="1564138" cy="369332"/>
+            <a:off x="160832" y="2225476"/>
+            <a:ext cx="1685077" cy="369332"/>
           </a:xfrm>
           <a:prstGeom prst="rect">
             <a:avLst/>
@@ -6324,16 +6608,17 @@
           <a:noFill/>
         </p:spPr>
         <p:txBody>
-          <a:bodyPr wrap="none" rtlCol="0">
+          <a:bodyPr wrap="none" rtlCol="0" anchor="t">
             <a:spAutoFit/>
           </a:bodyPr>
           <a:lstStyle/>
           <a:p>
             <a:r>
-              <a:rPr lang="nl-NL" dirty="0" smtClean="0"/>
+              <a:rPr lang="nl-NL" dirty="0">
+                <a:latin typeface="Comic Sans MS"/>
+              </a:rPr>
               <a:t>Keuze genoeg!</a:t>
             </a:r>
-            <a:endParaRPr lang="nl-NL" dirty="0"/>
           </a:p>
         </p:txBody>
       </p:sp>
@@ -6353,8 +6638,8 @@
         </p:blipFill>
         <p:spPr>
           <a:xfrm>
-            <a:off x="4892462" y="2429080"/>
-            <a:ext cx="3794338" cy="2899738"/>
+            <a:off x="5293002" y="1413079"/>
+            <a:ext cx="3413338" cy="2596892"/>
           </a:xfrm>
           <a:prstGeom prst="rect">
             <a:avLst/>
@@ -6369,8 +6654,8 @@
         </p:nvSpPr>
         <p:spPr>
           <a:xfrm>
-            <a:off x="456198" y="3945276"/>
-            <a:ext cx="4022142" cy="2585323"/>
+            <a:off x="319428" y="3769430"/>
+            <a:ext cx="4594528" cy="2585323"/>
           </a:xfrm>
           <a:prstGeom prst="rect">
             <a:avLst/>
@@ -6378,33 +6663,43 @@
           <a:noFill/>
         </p:spPr>
         <p:txBody>
-          <a:bodyPr wrap="none" rtlCol="0">
+          <a:bodyPr wrap="none" rtlCol="0" anchor="t">
             <a:spAutoFit/>
           </a:bodyPr>
           <a:lstStyle/>
           <a:p>
             <a:r>
-              <a:rPr lang="nl-NL" dirty="0" smtClean="0"/>
+              <a:rPr lang="nl-NL" dirty="0">
+                <a:latin typeface="Comic Sans MS"/>
+              </a:rPr>
               <a:t>Het spel is af of niet ?</a:t>
             </a:r>
           </a:p>
           <a:p>
-            <a:endParaRPr lang="nl-NL" dirty="0"/>
-          </a:p>
-          <a:p>
-            <a:r>
-              <a:rPr lang="nl-NL" dirty="0" smtClean="0"/>
+            <a:endParaRPr lang="nl-NL" dirty="0">
+              <a:latin typeface="Comic Sans MS"/>
+            </a:endParaRPr>
+          </a:p>
+          <a:p>
+            <a:r>
+              <a:rPr lang="nl-NL" dirty="0">
+                <a:latin typeface="Comic Sans MS"/>
+              </a:rPr>
               <a:t>Bedenk wat je nog kan toevoegen</a:t>
             </a:r>
           </a:p>
           <a:p>
             <a:r>
-              <a:rPr lang="nl-NL" dirty="0" smtClean="0"/>
+              <a:rPr lang="nl-NL" dirty="0">
+                <a:latin typeface="Comic Sans MS"/>
+              </a:rPr>
               <a:t>Om het spel leuker / moeilijker te maken</a:t>
             </a:r>
           </a:p>
           <a:p>
-            <a:endParaRPr lang="nl-NL" dirty="0" smtClean="0"/>
+            <a:endParaRPr lang="nl-NL" dirty="0">
+              <a:latin typeface="Comic Sans MS"/>
+            </a:endParaRPr>
           </a:p>
           <a:p>
             <a:pPr marL="285750" indent="-285750">
@@ -6412,7 +6707,9 @@
               <a:buChar char="•"/>
             </a:pPr>
             <a:r>
-              <a:rPr lang="nl-NL" dirty="0" smtClean="0"/>
+              <a:rPr lang="nl-NL" dirty="0">
+                <a:latin typeface="Comic Sans MS"/>
+              </a:rPr>
               <a:t>Kleinere ballonnen</a:t>
             </a:r>
           </a:p>
@@ -6422,7 +6719,9 @@
               <a:buChar char="•"/>
             </a:pPr>
             <a:r>
-              <a:rPr lang="nl-NL" dirty="0" smtClean="0"/>
+              <a:rPr lang="nl-NL" dirty="0">
+                <a:latin typeface="Comic Sans MS"/>
+              </a:rPr>
               <a:t>Stijgsnelheid</a:t>
             </a:r>
           </a:p>
@@ -6432,10 +6731,11 @@
               <a:buChar char="•"/>
             </a:pPr>
             <a:r>
-              <a:rPr lang="nl-NL" dirty="0" smtClean="0"/>
+              <a:rPr lang="nl-NL" dirty="0">
+                <a:latin typeface="Comic Sans MS"/>
+              </a:rPr>
               <a:t>Ballonnen ook opzij laten bewegen</a:t>
             </a:r>
-            <a:endParaRPr lang="nl-NL" dirty="0"/>
           </a:p>
           <a:p>
             <a:pPr marL="285750" indent="-285750">
@@ -6462,7 +6762,7 @@
         </p:blipFill>
         <p:spPr>
           <a:xfrm>
-            <a:off x="4191231" y="5259726"/>
+            <a:off x="4386616" y="5054570"/>
             <a:ext cx="574217" cy="1096624"/>
           </a:xfrm>
           <a:prstGeom prst="rect">
@@ -6480,13 +6780,6 @@
   <p:clrMapOvr>
     <a:masterClrMapping/>
   </p:clrMapOvr>
-  <p:timing>
-    <p:tnLst>
-      <p:par>
-        <p:cTn xmlns:p14="http://schemas.microsoft.com/office/powerpoint/2010/main" id="1" dur="indefinite" restart="never" nodeType="tmRoot"/>
-      </p:par>
-    </p:tnLst>
-  </p:timing>
 </p:sld>
 </file>
 

</xml_diff>